<commit_message>
:memo: 2019/03/16 增加 readme
</commit_message>
<xml_diff>
--- a/搜索引擎.pptx
+++ b/搜索引擎.pptx
@@ -5,7 +5,7 @@
     <p:sldMasterId id="2147483648" r:id="rId1"/>
   </p:sldMasterIdLst>
   <p:notesMasterIdLst>
-    <p:notesMasterId r:id="rId23"/>
+    <p:notesMasterId r:id="rId24"/>
   </p:notesMasterIdLst>
   <p:sldIdLst>
     <p:sldId id="256" r:id="rId2"/>
@@ -15,20 +15,21 @@
     <p:sldId id="260" r:id="rId6"/>
     <p:sldId id="262" r:id="rId7"/>
     <p:sldId id="261" r:id="rId8"/>
-    <p:sldId id="263" r:id="rId9"/>
-    <p:sldId id="264" r:id="rId10"/>
-    <p:sldId id="265" r:id="rId11"/>
-    <p:sldId id="266" r:id="rId12"/>
-    <p:sldId id="268" r:id="rId13"/>
-    <p:sldId id="269" r:id="rId14"/>
-    <p:sldId id="270" r:id="rId15"/>
-    <p:sldId id="271" r:id="rId16"/>
-    <p:sldId id="267" r:id="rId17"/>
-    <p:sldId id="276" r:id="rId18"/>
-    <p:sldId id="272" r:id="rId19"/>
-    <p:sldId id="274" r:id="rId20"/>
-    <p:sldId id="273" r:id="rId21"/>
-    <p:sldId id="275" r:id="rId22"/>
+    <p:sldId id="277" r:id="rId9"/>
+    <p:sldId id="263" r:id="rId10"/>
+    <p:sldId id="264" r:id="rId11"/>
+    <p:sldId id="265" r:id="rId12"/>
+    <p:sldId id="266" r:id="rId13"/>
+    <p:sldId id="268" r:id="rId14"/>
+    <p:sldId id="269" r:id="rId15"/>
+    <p:sldId id="270" r:id="rId16"/>
+    <p:sldId id="271" r:id="rId17"/>
+    <p:sldId id="267" r:id="rId18"/>
+    <p:sldId id="276" r:id="rId19"/>
+    <p:sldId id="272" r:id="rId20"/>
+    <p:sldId id="274" r:id="rId21"/>
+    <p:sldId id="273" r:id="rId22"/>
+    <p:sldId id="275" r:id="rId23"/>
   </p:sldIdLst>
   <p:sldSz cx="12192000" cy="6858000"/>
   <p:notesSz cx="6858000" cy="9144000"/>
@@ -223,7 +224,7 @@
           <a:p>
             <a:fld id="{45A84516-EAD2-4CA7-B94A-B2250A89AE91}" type="datetimeFigureOut">
               <a:rPr lang="zh-CN" altLang="en-US" smtClean="0"/>
-              <a:t>2019/3/4</a:t>
+              <a:t>2019/3/16</a:t>
             </a:fld>
             <a:endParaRPr lang="zh-CN" altLang="en-US"/>
           </a:p>
@@ -888,7 +889,7 @@
           <a:p>
             <a:fld id="{83284890-85D2-4D7B-8EF5-15A9C1DB8F42}" type="datetimeFigureOut">
               <a:rPr lang="en-US" dirty="0"/>
-              <a:t>3/4/2019</a:t>
+              <a:t>3/16/2019</a:t>
             </a:fld>
             <a:endParaRPr lang="en-US" dirty="0"/>
           </a:p>
@@ -1062,7 +1063,7 @@
           <a:p>
             <a:fld id="{87157CC2-0FC8-4686-B024-99790E0F5162}" type="datetimeFigureOut">
               <a:rPr lang="en-US" dirty="0"/>
-              <a:t>3/4/2019</a:t>
+              <a:t>3/16/2019</a:t>
             </a:fld>
             <a:endParaRPr lang="en-US" dirty="0"/>
           </a:p>
@@ -1237,7 +1238,7 @@
           <a:p>
             <a:fld id="{F6764DA5-CD3D-4590-A511-FCD3BC7A793E}" type="datetimeFigureOut">
               <a:rPr lang="en-US" dirty="0"/>
-              <a:t>3/4/2019</a:t>
+              <a:t>3/16/2019</a:t>
             </a:fld>
             <a:endParaRPr lang="en-US" dirty="0"/>
           </a:p>
@@ -1402,7 +1403,7 @@
           <a:p>
             <a:fld id="{82F5661D-6934-4B32-B92C-470368BF1EC6}" type="datetimeFigureOut">
               <a:rPr lang="en-US" dirty="0"/>
-              <a:t>3/4/2019</a:t>
+              <a:t>3/16/2019</a:t>
             </a:fld>
             <a:endParaRPr lang="en-US" dirty="0"/>
           </a:p>
@@ -1710,7 +1711,7 @@
           <a:p>
             <a:fld id="{C6F822A4-8DA6-4447-9B1F-C5DB58435268}" type="datetimeFigureOut">
               <a:rPr lang="en-US" dirty="0"/>
-              <a:t>3/4/2019</a:t>
+              <a:t>3/16/2019</a:t>
             </a:fld>
             <a:endParaRPr lang="en-US" dirty="0"/>
           </a:p>
@@ -2091,7 +2092,7 @@
           <a:p>
             <a:fld id="{E548D31E-DCDA-41A7-9C67-C4B11B94D21D}" type="datetimeFigureOut">
               <a:rPr lang="en-US" dirty="0"/>
-              <a:t>3/4/2019</a:t>
+              <a:t>3/16/2019</a:t>
             </a:fld>
             <a:endParaRPr lang="en-US" dirty="0"/>
           </a:p>
@@ -2520,7 +2521,7 @@
           <a:p>
             <a:fld id="{9B3762C0-B258-48F1-ADE6-176B4174CCDD}" type="datetimeFigureOut">
               <a:rPr lang="en-US" dirty="0"/>
-              <a:t>3/4/2019</a:t>
+              <a:t>3/16/2019</a:t>
             </a:fld>
             <a:endParaRPr lang="en-US" dirty="0"/>
           </a:p>
@@ -2633,7 +2634,7 @@
           <a:p>
             <a:fld id="{677919A6-33EB-49BD-A62F-1FA56B9F9712}" type="datetimeFigureOut">
               <a:rPr lang="en-US" dirty="0"/>
-              <a:t>3/4/2019</a:t>
+              <a:t>3/16/2019</a:t>
             </a:fld>
             <a:endParaRPr lang="en-US" dirty="0"/>
           </a:p>
@@ -2723,7 +2724,7 @@
           <a:p>
             <a:fld id="{CA4E7D1B-D673-4CF6-8672-009D42ABD2A0}" type="datetimeFigureOut">
               <a:rPr lang="en-US" dirty="0"/>
-              <a:t>3/4/2019</a:t>
+              <a:t>3/16/2019</a:t>
             </a:fld>
             <a:endParaRPr lang="en-US" dirty="0"/>
           </a:p>
@@ -3068,7 +3069,7 @@
           <a:p>
             <a:fld id="{DA16AA21-1863-4931-97CB-99D0A168701B}" type="datetimeFigureOut">
               <a:rPr lang="en-US" dirty="0"/>
-              <a:t>3/4/2019</a:t>
+              <a:t>3/16/2019</a:t>
             </a:fld>
             <a:endParaRPr lang="en-US" dirty="0"/>
           </a:p>
@@ -3488,7 +3489,7 @@
           <a:p>
             <a:fld id="{3772C379-9A7C-4C87-A116-CBE9F58B04C5}" type="datetimeFigureOut">
               <a:rPr lang="en-US" dirty="0"/>
-              <a:t>3/4/2019</a:t>
+              <a:t>3/16/2019</a:t>
             </a:fld>
             <a:endParaRPr lang="en-US" dirty="0"/>
           </a:p>
@@ -3764,7 +3765,7 @@
           <a:p>
             <a:fld id="{8664C608-40B1-4030-A28D-5B74BC98ADCE}" type="datetimeFigureOut">
               <a:rPr lang="en-US" dirty="0"/>
-              <a:t>3/4/2019</a:t>
+              <a:t>3/16/2019</a:t>
             </a:fld>
             <a:endParaRPr lang="en-US" dirty="0"/>
           </a:p>
@@ -4432,20 +4433,14 @@
           <a:p>
             <a:r>
               <a:rPr lang="zh-CN" altLang="en-US" dirty="0"/>
-              <a:t>分析系统运行监控</a:t>
-            </a:r>
-          </a:p>
-        </p:txBody>
-      </p:sp>
-      <p:sp>
-        <p:nvSpPr>
-          <p:cNvPr id="4" name="内容占位符 3">
-            <a:extLst>
-              <a:ext uri="{FF2B5EF4-FFF2-40B4-BE49-F238E27FC236}">
-                <a16:creationId xmlns:a16="http://schemas.microsoft.com/office/drawing/2014/main" id="{1BB50C68-A318-430B-A1DC-41C2C3A79223}"/>
-              </a:ext>
-            </a:extLst>
-          </p:cNvPr>
+              <a:t>正文提取</a:t>
+            </a:r>
+          </a:p>
+        </p:txBody>
+      </p:sp>
+      <p:sp>
+        <p:nvSpPr>
+          <p:cNvPr id="3" name="内容占位符 2"/>
           <p:cNvSpPr>
             <a:spLocks noGrp="1"/>
           </p:cNvSpPr>
@@ -4458,40 +4453,193 @@
           <a:bodyPr/>
           <a:lstStyle/>
           <a:p>
-            <a:endParaRPr lang="zh-CN" altLang="en-US"/>
-          </a:p>
-        </p:txBody>
-      </p:sp>
-      <p:pic>
-        <p:nvPicPr>
-          <p:cNvPr id="6" name="图片 5">
-            <a:extLst>
-              <a:ext uri="{FF2B5EF4-FFF2-40B4-BE49-F238E27FC236}">
-                <a16:creationId xmlns:a16="http://schemas.microsoft.com/office/drawing/2014/main" id="{B2920791-338D-4A75-BE08-1D476F1B3CDF}"/>
-              </a:ext>
-            </a:extLst>
-          </p:cNvPr>
-          <p:cNvPicPr>
-            <a:picLocks noChangeAspect="1"/>
-          </p:cNvPicPr>
+            <a:r>
+              <a:rPr lang="zh-CN" altLang="en-US" dirty="0"/>
+              <a:t>统计空行 </a:t>
+            </a:r>
+            <a:r>
+              <a:rPr lang="en-US" altLang="zh-CN" dirty="0"/>
+              <a:t>1-6   8-9   13-14 </a:t>
+            </a:r>
+            <a:r>
+              <a:rPr lang="zh-CN" altLang="en-US" dirty="0"/>
+              <a:t>（实际上小于五行的空行不统计）</a:t>
+            </a:r>
+            <a:endParaRPr lang="en-US" altLang="zh-CN" dirty="0"/>
+          </a:p>
+          <a:p>
+            <a:r>
+              <a:rPr lang="zh-CN" altLang="en-US" dirty="0"/>
+              <a:t>统计两个空行之间的字数对于以上三个进行评分</a:t>
+            </a:r>
+            <a:endParaRPr lang="en-US" altLang="zh-CN" dirty="0"/>
+          </a:p>
+          <a:p>
+            <a:r>
+              <a:rPr lang="en-US" altLang="zh-CN" dirty="0"/>
+              <a:t>1-6 8-9  </a:t>
+            </a:r>
+            <a:r>
+              <a:rPr lang="zh-CN" altLang="en-US" dirty="0"/>
+              <a:t>之间字数 </a:t>
+            </a:r>
+            <a:r>
+              <a:rPr lang="en-US" altLang="zh-CN" dirty="0"/>
+              <a:t>5                6*2 + 5 = 17</a:t>
+            </a:r>
+          </a:p>
+          <a:p>
+            <a:r>
+              <a:rPr lang="en-US" altLang="zh-CN" dirty="0"/>
+              <a:t>8-9 13-14 </a:t>
+            </a:r>
+            <a:r>
+              <a:rPr lang="zh-CN" altLang="en-US" dirty="0"/>
+              <a:t>之间字数 </a:t>
+            </a:r>
+            <a:r>
+              <a:rPr lang="en-US" altLang="zh-CN" dirty="0"/>
+              <a:t>27          2*2 + 27 = 31</a:t>
+            </a:r>
+          </a:p>
+          <a:p>
+            <a:r>
+              <a:rPr lang="en-US" altLang="zh-CN" dirty="0"/>
+              <a:t>13-14 – end </a:t>
+            </a:r>
+            <a:r>
+              <a:rPr lang="zh-CN" altLang="en-US" dirty="0"/>
+              <a:t>字数 </a:t>
+            </a:r>
+            <a:r>
+              <a:rPr lang="en-US" altLang="zh-CN" dirty="0"/>
+              <a:t>2               2*3 + 2 = 8</a:t>
+            </a:r>
+          </a:p>
+          <a:p>
+            <a:r>
+              <a:rPr lang="zh-CN" altLang="en-US" dirty="0"/>
+              <a:t>提取分数最高的作为正文</a:t>
+            </a:r>
+          </a:p>
+        </p:txBody>
+      </p:sp>
+      <p:sp>
+        <p:nvSpPr>
+          <p:cNvPr id="4" name="矩形 3"/>
+          <p:cNvSpPr/>
           <p:nvPr/>
-        </p:nvPicPr>
-        <p:blipFill>
-          <a:blip r:embed="rId2"/>
-          <a:stretch>
-            <a:fillRect/>
-          </a:stretch>
-        </p:blipFill>
-        <p:spPr>
-          <a:xfrm>
-            <a:off x="1063752" y="1791489"/>
-            <a:ext cx="10058400" cy="4581879"/>
+        </p:nvSpPr>
+        <p:spPr>
+          <a:xfrm>
+            <a:off x="7487479" y="1924883"/>
+            <a:ext cx="3525078" cy="4247317"/>
           </a:xfrm>
           <a:prstGeom prst="rect">
             <a:avLst/>
           </a:prstGeom>
         </p:spPr>
-      </p:pic>
+        <p:txBody>
+          <a:bodyPr wrap="square">
+            <a:spAutoFit/>
+          </a:bodyPr>
+          <a:lstStyle/>
+          <a:p>
+            <a:r>
+              <a:rPr lang="en-US" altLang="zh-CN" dirty="0"/>
+              <a:t>1</a:t>
+            </a:r>
+          </a:p>
+          <a:p>
+            <a:r>
+              <a:rPr lang="en-US" altLang="zh-CN" dirty="0"/>
+              <a:t>2</a:t>
+            </a:r>
+          </a:p>
+          <a:p>
+            <a:r>
+              <a:rPr lang="en-US" altLang="zh-CN" dirty="0"/>
+              <a:t>3</a:t>
+            </a:r>
+          </a:p>
+          <a:p>
+            <a:r>
+              <a:rPr lang="en-US" altLang="zh-CN" dirty="0"/>
+              <a:t>4</a:t>
+            </a:r>
+          </a:p>
+          <a:p>
+            <a:r>
+              <a:rPr lang="en-US" altLang="zh-CN" dirty="0"/>
+              <a:t>5</a:t>
+            </a:r>
+          </a:p>
+          <a:p>
+            <a:r>
+              <a:rPr lang="en-US" altLang="zh-CN" dirty="0"/>
+              <a:t>6</a:t>
+            </a:r>
+          </a:p>
+          <a:p>
+            <a:r>
+              <a:rPr lang="en-US" altLang="zh-CN" dirty="0"/>
+              <a:t>7                             hello</a:t>
+            </a:r>
+          </a:p>
+          <a:p>
+            <a:r>
+              <a:rPr lang="en-US" altLang="zh-CN" dirty="0"/>
+              <a:t>8</a:t>
+            </a:r>
+          </a:p>
+          <a:p>
+            <a:r>
+              <a:rPr lang="en-US" altLang="zh-CN" dirty="0"/>
+              <a:t>9</a:t>
+            </a:r>
+          </a:p>
+          <a:p>
+            <a:r>
+              <a:rPr lang="en-US" altLang="zh-CN" dirty="0"/>
+              <a:t>10                         123456789</a:t>
+            </a:r>
+          </a:p>
+          <a:p>
+            <a:r>
+              <a:rPr lang="en-US" altLang="zh-CN" dirty="0"/>
+              <a:t>11                         123456789</a:t>
+            </a:r>
+          </a:p>
+          <a:p>
+            <a:r>
+              <a:rPr lang="en-US" altLang="zh-CN" dirty="0"/>
+              <a:t>12                         123456789</a:t>
+            </a:r>
+          </a:p>
+          <a:p>
+            <a:r>
+              <a:rPr lang="en-US" altLang="zh-CN" dirty="0"/>
+              <a:t>13</a:t>
+            </a:r>
+          </a:p>
+          <a:p>
+            <a:r>
+              <a:rPr lang="en-US" altLang="zh-CN" dirty="0"/>
+              <a:t>14</a:t>
+            </a:r>
+          </a:p>
+          <a:p>
+            <a:r>
+              <a:rPr lang="en-US" altLang="zh-CN" dirty="0"/>
+              <a:t>15                       </a:t>
+            </a:r>
+            <a:r>
+              <a:rPr lang="zh-CN" altLang="en-US" dirty="0"/>
+              <a:t>版权</a:t>
+            </a:r>
+          </a:p>
+        </p:txBody>
+      </p:sp>
     </p:spTree>
   </p:cSld>
   <p:clrMapOvr>
@@ -4534,14 +4682,20 @@
           <a:p>
             <a:r>
               <a:rPr lang="zh-CN" altLang="en-US" dirty="0"/>
-              <a:t>索引系统</a:t>
-            </a:r>
-          </a:p>
-        </p:txBody>
-      </p:sp>
-      <p:sp>
-        <p:nvSpPr>
-          <p:cNvPr id="3" name="内容占位符 2"/>
+              <a:t>分析系统运行监控</a:t>
+            </a:r>
+          </a:p>
+        </p:txBody>
+      </p:sp>
+      <p:sp>
+        <p:nvSpPr>
+          <p:cNvPr id="4" name="内容占位符 3">
+            <a:extLst>
+              <a:ext uri="{FF2B5EF4-FFF2-40B4-BE49-F238E27FC236}">
+                <a16:creationId xmlns:a16="http://schemas.microsoft.com/office/drawing/2014/main" id="{1BB50C68-A318-430B-A1DC-41C2C3A79223}"/>
+              </a:ext>
+            </a:extLst>
+          </p:cNvPr>
           <p:cNvSpPr>
             <a:spLocks noGrp="1"/>
           </p:cNvSpPr>
@@ -4554,32 +4708,40 @@
           <a:bodyPr/>
           <a:lstStyle/>
           <a:p>
-            <a:r>
-              <a:rPr lang="zh-CN" altLang="en-US" dirty="0"/>
-              <a:t>基于</a:t>
-            </a:r>
-            <a:r>
-              <a:rPr lang="en-US" altLang="zh-CN" dirty="0"/>
-              <a:t>Lucene</a:t>
-            </a:r>
-            <a:r>
-              <a:rPr lang="zh-CN" altLang="en-US" dirty="0"/>
-              <a:t>的索引系统</a:t>
-            </a:r>
-            <a:endParaRPr lang="en-US" altLang="zh-CN" dirty="0"/>
-          </a:p>
-          <a:p>
-            <a:r>
-              <a:rPr lang="en-US" altLang="zh-CN" dirty="0"/>
-              <a:t>Lucene</a:t>
-            </a:r>
-            <a:r>
-              <a:rPr lang="zh-CN" altLang="en-US" dirty="0"/>
-              <a:t>是一个开源的全文检索引擎工具包，具有稳定，索引性能高，高效准确的搜索算法，跨平台的解决方案等特点</a:t>
-            </a:r>
-          </a:p>
-        </p:txBody>
-      </p:sp>
+            <a:endParaRPr lang="zh-CN" altLang="en-US"/>
+          </a:p>
+        </p:txBody>
+      </p:sp>
+      <p:pic>
+        <p:nvPicPr>
+          <p:cNvPr id="6" name="图片 5">
+            <a:extLst>
+              <a:ext uri="{FF2B5EF4-FFF2-40B4-BE49-F238E27FC236}">
+                <a16:creationId xmlns:a16="http://schemas.microsoft.com/office/drawing/2014/main" id="{B2920791-338D-4A75-BE08-1D476F1B3CDF}"/>
+              </a:ext>
+            </a:extLst>
+          </p:cNvPr>
+          <p:cNvPicPr>
+            <a:picLocks noChangeAspect="1"/>
+          </p:cNvPicPr>
+          <p:nvPr/>
+        </p:nvPicPr>
+        <p:blipFill>
+          <a:blip r:embed="rId2"/>
+          <a:stretch>
+            <a:fillRect/>
+          </a:stretch>
+        </p:blipFill>
+        <p:spPr>
+          <a:xfrm>
+            <a:off x="1063752" y="1791489"/>
+            <a:ext cx="10058400" cy="4581879"/>
+          </a:xfrm>
+          <a:prstGeom prst="rect">
+            <a:avLst/>
+          </a:prstGeom>
+        </p:spPr>
+      </p:pic>
     </p:spTree>
   </p:cSld>
   <p:clrMapOvr>
@@ -4621,125 +4783,50 @@
           <a:lstStyle/>
           <a:p>
             <a:r>
-              <a:rPr lang="en-US" altLang="zh-CN" dirty="0"/>
-              <a:t>Lucene</a:t>
-            </a:r>
-            <a:r>
-              <a:rPr lang="zh-CN" altLang="en-US" dirty="0"/>
-              <a:t>架构</a:t>
-            </a:r>
-          </a:p>
-        </p:txBody>
-      </p:sp>
-      <p:pic>
-        <p:nvPicPr>
-          <p:cNvPr id="1026" name="Picture 2" descr="image"/>
-          <p:cNvPicPr>
-            <a:picLocks noGrp="1" noChangeAspect="1" noChangeArrowheads="1"/>
-          </p:cNvPicPr>
+              <a:rPr lang="zh-CN" altLang="en-US" dirty="0"/>
+              <a:t>索引系统</a:t>
+            </a:r>
+          </a:p>
+        </p:txBody>
+      </p:sp>
+      <p:sp>
+        <p:nvSpPr>
+          <p:cNvPr id="3" name="内容占位符 2"/>
+          <p:cNvSpPr>
+            <a:spLocks noGrp="1"/>
+          </p:cNvSpPr>
           <p:nvPr>
             <p:ph idx="1"/>
           </p:nvPr>
-        </p:nvPicPr>
-        <p:blipFill>
-          <a:blip r:embed="rId2">
-            <a:extLst>
-              <a:ext uri="{28A0092B-C50C-407E-A947-70E740481C1C}">
-                <a14:useLocalDpi xmlns:a14="http://schemas.microsoft.com/office/drawing/2010/main" val="0"/>
-              </a:ext>
-            </a:extLst>
-          </a:blip>
-          <a:srcRect/>
-          <a:stretch>
-            <a:fillRect/>
-          </a:stretch>
-        </p:blipFill>
-        <p:spPr bwMode="auto">
-          <a:xfrm>
-            <a:off x="6373652" y="2093976"/>
-            <a:ext cx="4748500" cy="4051300"/>
-          </a:xfrm>
-          <a:prstGeom prst="rect">
-            <a:avLst/>
-          </a:prstGeom>
-          <a:noFill/>
-          <a:extLst>
-            <a:ext uri="{909E8E84-426E-40DD-AFC4-6F175D3DCCD1}">
-              <a14:hiddenFill xmlns:a14="http://schemas.microsoft.com/office/drawing/2010/main">
-                <a:solidFill>
-                  <a:srgbClr val="FFFFFF"/>
-                </a:solidFill>
-              </a14:hiddenFill>
-            </a:ext>
-          </a:extLst>
-        </p:spPr>
-      </p:pic>
-      <p:sp>
-        <p:nvSpPr>
-          <p:cNvPr id="4" name="文本框 3"/>
-          <p:cNvSpPr txBox="1"/>
-          <p:nvPr/>
-        </p:nvSpPr>
-        <p:spPr>
-          <a:xfrm>
-            <a:off x="764771" y="2942706"/>
-            <a:ext cx="4896196" cy="2585323"/>
-          </a:xfrm>
-          <a:prstGeom prst="rect">
-            <a:avLst/>
-          </a:prstGeom>
-          <a:noFill/>
-        </p:spPr>
-        <p:txBody>
-          <a:bodyPr wrap="square" rtlCol="0">
-            <a:spAutoFit/>
-          </a:bodyPr>
-          <a:lstStyle/>
-          <a:p>
+        </p:nvSpPr>
+        <p:spPr/>
+        <p:txBody>
+          <a:bodyPr/>
+          <a:lstStyle/>
+          <a:p>
+            <a:r>
+              <a:rPr lang="zh-CN" altLang="en-US" dirty="0"/>
+              <a:t>基于</a:t>
+            </a:r>
             <a:r>
               <a:rPr lang="en-US" altLang="zh-CN" dirty="0"/>
               <a:t>Lucene</a:t>
             </a:r>
             <a:r>
               <a:rPr lang="zh-CN" altLang="en-US" dirty="0"/>
-              <a:t>只是一个全文检索引擎的工具包，它并不是一个完整的全文检索引擎。</a:t>
+              <a:t>的索引系统</a:t>
             </a:r>
             <a:endParaRPr lang="en-US" altLang="zh-CN" dirty="0"/>
           </a:p>
           <a:p>
-            <a:endParaRPr lang="en-US" altLang="zh-CN" dirty="0"/>
-          </a:p>
-          <a:p>
             <a:r>
               <a:rPr lang="en-US" altLang="zh-CN" dirty="0"/>
               <a:t>Lucene</a:t>
             </a:r>
             <a:r>
               <a:rPr lang="zh-CN" altLang="en-US" dirty="0"/>
-              <a:t>只负责创建与管理索引，提供查询接口，</a:t>
-            </a:r>
-            <a:endParaRPr lang="en-US" altLang="zh-CN" dirty="0"/>
-          </a:p>
-          <a:p>
-            <a:r>
-              <a:rPr lang="zh-CN" altLang="en-US" dirty="0"/>
-              <a:t>我们需要自己提供所需要的数据，自行对结果进行渲染。</a:t>
-            </a:r>
-            <a:endParaRPr lang="en-US" altLang="zh-CN" dirty="0"/>
-          </a:p>
-          <a:p>
-            <a:endParaRPr lang="en-US" altLang="zh-CN" dirty="0"/>
-          </a:p>
-          <a:p>
-            <a:r>
-              <a:rPr lang="en-US" altLang="zh-CN" dirty="0"/>
-              <a:t>Lucene</a:t>
-            </a:r>
-            <a:r>
-              <a:rPr lang="zh-CN" altLang="en-US" dirty="0"/>
-              <a:t>注重于对索引的建立与底层优化，对于应用系统需要用户自行编写。</a:t>
-            </a:r>
-            <a:endParaRPr lang="en-US" altLang="zh-CN" dirty="0"/>
+              <a:t>是一个开源的全文检索引擎工具包，具有稳定，索引性能高，高效准确的搜索算法，跨平台的解决方案等特点</a:t>
+            </a:r>
           </a:p>
         </p:txBody>
       </p:sp>
@@ -4789,112 +4876,123 @@
             </a:r>
             <a:r>
               <a:rPr lang="zh-CN" altLang="en-US" dirty="0"/>
-              <a:t>构建索引的过程</a:t>
-            </a:r>
-          </a:p>
-        </p:txBody>
-      </p:sp>
-      <p:sp>
-        <p:nvSpPr>
-          <p:cNvPr id="3" name="内容占位符 2"/>
-          <p:cNvSpPr>
-            <a:spLocks noGrp="1"/>
-          </p:cNvSpPr>
+              <a:t>架构</a:t>
+            </a:r>
+          </a:p>
+        </p:txBody>
+      </p:sp>
+      <p:pic>
+        <p:nvPicPr>
+          <p:cNvPr id="1026" name="Picture 2" descr="image"/>
+          <p:cNvPicPr>
+            <a:picLocks noGrp="1" noChangeAspect="1" noChangeArrowheads="1"/>
+          </p:cNvPicPr>
           <p:nvPr>
             <p:ph idx="1"/>
           </p:nvPr>
-        </p:nvSpPr>
-        <p:spPr>
-          <a:xfrm>
-            <a:off x="1069848" y="2121408"/>
-            <a:ext cx="5289388" cy="4050792"/>
-          </a:xfrm>
-        </p:spPr>
-        <p:txBody>
-          <a:bodyPr/>
-          <a:lstStyle/>
-          <a:p>
-            <a:pPr marL="0" indent="0">
-              <a:buNone/>
-            </a:pPr>
-            <a:r>
-              <a:rPr lang="zh-CN" altLang="en-US" dirty="0"/>
-              <a:t>创建索引的过程就犹如写文集一样，一个文集包含多篇文章，每篇文章包含文章的各种信息，例如文章标题，内容，作者等。</a:t>
-            </a:r>
-            <a:endParaRPr lang="en-US" altLang="zh-CN" dirty="0"/>
-          </a:p>
-          <a:p>
-            <a:pPr marL="457200" indent="-457200">
-              <a:buAutoNum type="arabicPeriod"/>
-            </a:pPr>
-            <a:r>
-              <a:rPr lang="zh-CN" altLang="en-US" dirty="0"/>
-              <a:t>首先我们先写文章。</a:t>
-            </a:r>
-            <a:endParaRPr lang="en-US" altLang="zh-CN" dirty="0"/>
-          </a:p>
-          <a:p>
-            <a:pPr marL="457200" indent="-457200">
-              <a:buAutoNum type="arabicPeriod"/>
-            </a:pPr>
-            <a:r>
-              <a:rPr lang="zh-CN" altLang="en-US" dirty="0"/>
-              <a:t>写文章的同时我们要向文章中加入文章的各种信息。</a:t>
-            </a:r>
-            <a:endParaRPr lang="en-US" altLang="zh-CN" dirty="0"/>
-          </a:p>
-          <a:p>
-            <a:pPr marL="457200" indent="-457200">
-              <a:buAutoNum type="arabicPeriod"/>
-            </a:pPr>
-            <a:r>
-              <a:rPr lang="zh-CN" altLang="en-US" dirty="0"/>
-              <a:t>然后我们将文章加入到文集中。</a:t>
-            </a:r>
-            <a:endParaRPr lang="en-US" altLang="zh-CN" dirty="0"/>
-          </a:p>
-          <a:p>
-            <a:pPr marL="0" indent="0">
-              <a:buNone/>
-            </a:pPr>
-            <a:endParaRPr lang="en-US" altLang="zh-CN" dirty="0"/>
-          </a:p>
-          <a:p>
-            <a:pPr marL="0" indent="0">
-              <a:buNone/>
-            </a:pPr>
-            <a:r>
-              <a:rPr lang="zh-CN" altLang="en-US" dirty="0"/>
-              <a:t>如右图所示，我们从右向左就是写文集的过程，从左到右便是读文集的过程</a:t>
-            </a:r>
-            <a:endParaRPr lang="en-US" altLang="zh-CN" dirty="0"/>
-          </a:p>
-        </p:txBody>
-      </p:sp>
-      <p:pic>
-        <p:nvPicPr>
-          <p:cNvPr id="4" name="图片 3"/>
-          <p:cNvPicPr>
-            <a:picLocks noChangeAspect="1"/>
-          </p:cNvPicPr>
-          <p:nvPr/>
         </p:nvPicPr>
         <p:blipFill>
-          <a:blip r:embed="rId2"/>
+          <a:blip r:embed="rId2">
+            <a:extLst>
+              <a:ext uri="{28A0092B-C50C-407E-A947-70E740481C1C}">
+                <a14:useLocalDpi xmlns:a14="http://schemas.microsoft.com/office/drawing/2010/main" val="0"/>
+              </a:ext>
+            </a:extLst>
+          </a:blip>
+          <a:srcRect/>
           <a:stretch>
             <a:fillRect/>
           </a:stretch>
         </p:blipFill>
-        <p:spPr>
-          <a:xfrm>
-            <a:off x="6359236" y="1899458"/>
-            <a:ext cx="5623059" cy="4717473"/>
+        <p:spPr bwMode="auto">
+          <a:xfrm>
+            <a:off x="6373652" y="2093976"/>
+            <a:ext cx="4748500" cy="4051300"/>
           </a:xfrm>
           <a:prstGeom prst="rect">
             <a:avLst/>
           </a:prstGeom>
+          <a:noFill/>
+          <a:extLst>
+            <a:ext uri="{909E8E84-426E-40DD-AFC4-6F175D3DCCD1}">
+              <a14:hiddenFill xmlns:a14="http://schemas.microsoft.com/office/drawing/2010/main">
+                <a:solidFill>
+                  <a:srgbClr val="FFFFFF"/>
+                </a:solidFill>
+              </a14:hiddenFill>
+            </a:ext>
+          </a:extLst>
         </p:spPr>
       </p:pic>
+      <p:sp>
+        <p:nvSpPr>
+          <p:cNvPr id="4" name="文本框 3"/>
+          <p:cNvSpPr txBox="1"/>
+          <p:nvPr/>
+        </p:nvSpPr>
+        <p:spPr>
+          <a:xfrm>
+            <a:off x="764771" y="2942706"/>
+            <a:ext cx="4896196" cy="2585323"/>
+          </a:xfrm>
+          <a:prstGeom prst="rect">
+            <a:avLst/>
+          </a:prstGeom>
+          <a:noFill/>
+        </p:spPr>
+        <p:txBody>
+          <a:bodyPr wrap="square" rtlCol="0">
+            <a:spAutoFit/>
+          </a:bodyPr>
+          <a:lstStyle/>
+          <a:p>
+            <a:r>
+              <a:rPr lang="en-US" altLang="zh-CN" dirty="0"/>
+              <a:t>Lucene</a:t>
+            </a:r>
+            <a:r>
+              <a:rPr lang="zh-CN" altLang="en-US" dirty="0"/>
+              <a:t>只是一个全文检索引擎的工具包，它并不是一个完整的全文检索引擎。</a:t>
+            </a:r>
+            <a:endParaRPr lang="en-US" altLang="zh-CN" dirty="0"/>
+          </a:p>
+          <a:p>
+            <a:endParaRPr lang="en-US" altLang="zh-CN" dirty="0"/>
+          </a:p>
+          <a:p>
+            <a:r>
+              <a:rPr lang="en-US" altLang="zh-CN" dirty="0"/>
+              <a:t>Lucene</a:t>
+            </a:r>
+            <a:r>
+              <a:rPr lang="zh-CN" altLang="en-US" dirty="0"/>
+              <a:t>只负责创建与管理索引，提供查询接口，</a:t>
+            </a:r>
+            <a:endParaRPr lang="en-US" altLang="zh-CN" dirty="0"/>
+          </a:p>
+          <a:p>
+            <a:r>
+              <a:rPr lang="zh-CN" altLang="en-US" dirty="0"/>
+              <a:t>我们需要自己提供所需要的数据，自行对结果进行渲染。</a:t>
+            </a:r>
+            <a:endParaRPr lang="en-US" altLang="zh-CN" dirty="0"/>
+          </a:p>
+          <a:p>
+            <a:endParaRPr lang="en-US" altLang="zh-CN" dirty="0"/>
+          </a:p>
+          <a:p>
+            <a:r>
+              <a:rPr lang="en-US" altLang="zh-CN" dirty="0"/>
+              <a:t>Lucene</a:t>
+            </a:r>
+            <a:r>
+              <a:rPr lang="zh-CN" altLang="en-US" dirty="0"/>
+              <a:t>注重于对索引的建立与底层优化，对于应用系统需要用户自行编写。</a:t>
+            </a:r>
+            <a:endParaRPr lang="en-US" altLang="zh-CN" dirty="0"/>
+          </a:p>
+        </p:txBody>
+      </p:sp>
     </p:spTree>
   </p:cSld>
   <p:clrMapOvr>
@@ -4959,49 +5057,67 @@
         <p:spPr>
           <a:xfrm>
             <a:off x="1069848" y="2121408"/>
-            <a:ext cx="5026152" cy="4354206"/>
+            <a:ext cx="5289388" cy="4050792"/>
           </a:xfrm>
         </p:spPr>
         <p:txBody>
           <a:bodyPr/>
           <a:lstStyle/>
           <a:p>
-            <a:r>
-              <a:rPr lang="en-US" altLang="zh-CN" dirty="0"/>
-              <a:t>Field</a:t>
-            </a:r>
-            <a:r>
-              <a:rPr lang="zh-CN" altLang="en-US" dirty="0"/>
-              <a:t>：文本域对象，存放文本中的各种信息</a:t>
+            <a:pPr marL="0" indent="0">
+              <a:buNone/>
+            </a:pPr>
+            <a:r>
+              <a:rPr lang="zh-CN" altLang="en-US" dirty="0"/>
+              <a:t>创建索引的过程就犹如写文集一样，一个文集包含多篇文章，每篇文章包含文章的各种信息，例如文章标题，内容，作者等。</a:t>
             </a:r>
             <a:endParaRPr lang="en-US" altLang="zh-CN" dirty="0"/>
           </a:p>
           <a:p>
+            <a:pPr marL="457200" indent="-457200">
+              <a:buAutoNum type="arabicPeriod"/>
+            </a:pPr>
+            <a:r>
+              <a:rPr lang="zh-CN" altLang="en-US" dirty="0"/>
+              <a:t>首先我们先写文章。</a:t>
+            </a:r>
             <a:endParaRPr lang="en-US" altLang="zh-CN" dirty="0"/>
           </a:p>
           <a:p>
-            <a:r>
-              <a:rPr lang="en-US" altLang="zh-CN" dirty="0"/>
-              <a:t>Document</a:t>
-            </a:r>
-            <a:r>
-              <a:rPr lang="zh-CN" altLang="en-US" dirty="0"/>
-              <a:t>：文档，可以理解问一篇篇的文章，一篇文档可以有多个文本域</a:t>
+            <a:pPr marL="457200" indent="-457200">
+              <a:buAutoNum type="arabicPeriod"/>
+            </a:pPr>
+            <a:r>
+              <a:rPr lang="zh-CN" altLang="en-US" dirty="0"/>
+              <a:t>写文章的同时我们要向文章中加入文章的各种信息。</a:t>
             </a:r>
             <a:endParaRPr lang="en-US" altLang="zh-CN" dirty="0"/>
           </a:p>
           <a:p>
+            <a:pPr marL="457200" indent="-457200">
+              <a:buAutoNum type="arabicPeriod"/>
+            </a:pPr>
+            <a:r>
+              <a:rPr lang="zh-CN" altLang="en-US" dirty="0"/>
+              <a:t>然后我们将文章加入到文集中。</a:t>
+            </a:r>
             <a:endParaRPr lang="en-US" altLang="zh-CN" dirty="0"/>
           </a:p>
           <a:p>
-            <a:r>
-              <a:rPr lang="en-US" altLang="zh-CN" dirty="0" err="1"/>
-              <a:t>IndexWriter</a:t>
-            </a:r>
-            <a:r>
-              <a:rPr lang="zh-CN" altLang="en-US" dirty="0"/>
-              <a:t>：索引写对象，该对象会把文档写入索引库</a:t>
-            </a:r>
+            <a:pPr marL="0" indent="0">
+              <a:buNone/>
+            </a:pPr>
+            <a:endParaRPr lang="en-US" altLang="zh-CN" dirty="0"/>
+          </a:p>
+          <a:p>
+            <a:pPr marL="0" indent="0">
+              <a:buNone/>
+            </a:pPr>
+            <a:r>
+              <a:rPr lang="zh-CN" altLang="en-US" dirty="0"/>
+              <a:t>如右图所示，我们从右向左就是写文集的过程，从左到右便是读文集的过程</a:t>
+            </a:r>
+            <a:endParaRPr lang="en-US" altLang="zh-CN" dirty="0"/>
           </a:p>
         </p:txBody>
       </p:sp>
@@ -5021,8 +5137,8 @@
         </p:blipFill>
         <p:spPr>
           <a:xfrm>
-            <a:off x="6338195" y="1890019"/>
-            <a:ext cx="5314340" cy="4585595"/>
+            <a:off x="6359236" y="1899458"/>
+            <a:ext cx="5623059" cy="4717473"/>
           </a:xfrm>
           <a:prstGeom prst="rect">
             <a:avLst/>
@@ -5070,8 +5186,12 @@
           <a:lstStyle/>
           <a:p>
             <a:r>
-              <a:rPr lang="zh-CN" altLang="en-US" dirty="0"/>
-              <a:t>分词器</a:t>
+              <a:rPr lang="en-US" altLang="zh-CN" dirty="0"/>
+              <a:t>Lucene</a:t>
+            </a:r>
+            <a:r>
+              <a:rPr lang="zh-CN" altLang="en-US" dirty="0"/>
+              <a:t>构建索引的过程</a:t>
             </a:r>
           </a:p>
         </p:txBody>
@@ -5089,7 +5209,7 @@
         <p:spPr>
           <a:xfrm>
             <a:off x="1069848" y="2121408"/>
-            <a:ext cx="5721650" cy="4050792"/>
+            <a:ext cx="5026152" cy="4354206"/>
           </a:xfrm>
         </p:spPr>
         <p:txBody>
@@ -5097,114 +5217,40 @@
           <a:lstStyle/>
           <a:p>
             <a:r>
-              <a:rPr lang="zh-CN" altLang="en-US" dirty="0"/>
-              <a:t>在向索引库写入文档的时候，分词器会把指定的文本域进行分词，然后对其建立索引并写入索引库中</a:t>
+              <a:rPr lang="en-US" altLang="zh-CN" dirty="0"/>
+              <a:t>Field</a:t>
+            </a:r>
+            <a:r>
+              <a:rPr lang="zh-CN" altLang="en-US" dirty="0"/>
+              <a:t>：文本域对象，存放文本中的各种信息</a:t>
             </a:r>
             <a:endParaRPr lang="en-US" altLang="zh-CN" dirty="0"/>
           </a:p>
           <a:p>
-            <a:r>
-              <a:rPr lang="zh-CN" altLang="en-US" dirty="0"/>
-              <a:t>标准分词器：</a:t>
-            </a:r>
+            <a:endParaRPr lang="en-US" altLang="zh-CN" dirty="0"/>
+          </a:p>
+          <a:p>
+            <a:r>
+              <a:rPr lang="en-US" altLang="zh-CN" dirty="0"/>
+              <a:t>Document</a:t>
+            </a:r>
+            <a:r>
+              <a:rPr lang="zh-CN" altLang="en-US" dirty="0"/>
+              <a:t>：文档，可以理解问一篇篇的文章，一篇文档可以有多个文本域</a:t>
+            </a:r>
+            <a:endParaRPr lang="en-US" altLang="zh-CN" dirty="0"/>
+          </a:p>
+          <a:p>
+            <a:endParaRPr lang="en-US" altLang="zh-CN" dirty="0"/>
+          </a:p>
+          <a:p>
             <a:r>
               <a:rPr lang="en-US" altLang="zh-CN" dirty="0" err="1"/>
-              <a:t>StandardAnalyzer</a:t>
-            </a:r>
-            <a:r>
-              <a:rPr lang="en-US" altLang="zh-CN" dirty="0"/>
-              <a:t> </a:t>
-            </a:r>
-            <a:r>
-              <a:rPr lang="zh-CN" altLang="en-US" dirty="0"/>
-              <a:t>该分词器对英文支持比较好，但中文的支持很差。</a:t>
-            </a:r>
-            <a:endParaRPr lang="en-US" altLang="zh-CN" dirty="0"/>
-          </a:p>
-          <a:p>
-            <a:r>
-              <a:rPr lang="en-US" altLang="zh-CN" dirty="0"/>
-              <a:t>IK</a:t>
-            </a:r>
-            <a:r>
-              <a:rPr lang="zh-CN" altLang="en-US" dirty="0"/>
-              <a:t>分词器：</a:t>
-            </a:r>
-            <a:r>
-              <a:rPr lang="en-US" altLang="zh-CN" dirty="0" err="1"/>
-              <a:t>IKAnalyzer</a:t>
-            </a:r>
-            <a:r>
-              <a:rPr lang="en-US" altLang="zh-CN" dirty="0"/>
-              <a:t> IK</a:t>
-            </a:r>
-            <a:r>
-              <a:rPr lang="zh-CN" altLang="en-US" dirty="0"/>
-              <a:t>分词器是一个开源的、基于</a:t>
-            </a:r>
-            <a:r>
-              <a:rPr lang="en-US" altLang="zh-CN" dirty="0"/>
-              <a:t>Java</a:t>
-            </a:r>
-            <a:r>
-              <a:rPr lang="zh-CN" altLang="en-US" dirty="0"/>
-              <a:t>语言开发的轻量级中文分词器，对中文友好并支持智能分词模式；但是</a:t>
-            </a:r>
-            <a:r>
-              <a:rPr lang="en-US" altLang="zh-CN" dirty="0" err="1"/>
-              <a:t>IKAnalyzer</a:t>
-            </a:r>
-            <a:r>
-              <a:rPr lang="zh-CN" altLang="en-US" dirty="0"/>
-              <a:t>最后一个版本是</a:t>
-            </a:r>
-            <a:r>
-              <a:rPr lang="en-US" altLang="zh-CN" dirty="0"/>
-              <a:t>2012</a:t>
-            </a:r>
-            <a:r>
-              <a:rPr lang="zh-CN" altLang="en-US" dirty="0"/>
-              <a:t>年发布的，对现在的</a:t>
-            </a:r>
-            <a:r>
-              <a:rPr lang="en-US" altLang="zh-CN" dirty="0"/>
-              <a:t>Lucene</a:t>
-            </a:r>
-            <a:r>
-              <a:rPr lang="zh-CN" altLang="en-US" dirty="0"/>
-              <a:t>新版本不适用。所以我们查看了</a:t>
-            </a:r>
-            <a:r>
-              <a:rPr lang="en-US" altLang="zh-CN" dirty="0"/>
-              <a:t>Lucene</a:t>
-            </a:r>
-            <a:r>
-              <a:rPr lang="zh-CN" altLang="en-US" dirty="0"/>
-              <a:t>相关源码，在</a:t>
-            </a:r>
-            <a:r>
-              <a:rPr lang="en-US" altLang="zh-CN" dirty="0" err="1"/>
-              <a:t>IKAnalyzer</a:t>
-            </a:r>
-            <a:r>
-              <a:rPr lang="zh-CN" altLang="en-US" dirty="0"/>
-              <a:t>源码的基础上实现了最新版</a:t>
-            </a:r>
-            <a:r>
-              <a:rPr lang="en-US" altLang="zh-CN" dirty="0"/>
-              <a:t>Lucene</a:t>
-            </a:r>
-            <a:r>
-              <a:rPr lang="zh-CN" altLang="en-US" dirty="0"/>
-              <a:t>的接口，从而使</a:t>
-            </a:r>
-            <a:r>
-              <a:rPr lang="en-US" altLang="zh-CN" dirty="0"/>
-              <a:t>IK</a:t>
-            </a:r>
-            <a:r>
-              <a:rPr lang="zh-CN" altLang="en-US" dirty="0"/>
-              <a:t>分词器能够运行</a:t>
+              <a:t>IndexWriter</a:t>
+            </a:r>
+            <a:r>
+              <a:rPr lang="zh-CN" altLang="en-US" dirty="0"/>
+              <a:t>：索引写对象，该对象会把文档写入索引库</a:t>
             </a:r>
           </a:p>
         </p:txBody>
@@ -5225,244 +5271,14 @@
         </p:blipFill>
         <p:spPr>
           <a:xfrm>
-            <a:off x="6791325" y="4114800"/>
-            <a:ext cx="5373370" cy="1633220"/>
+            <a:off x="6338195" y="1890019"/>
+            <a:ext cx="5314340" cy="4585595"/>
           </a:xfrm>
           <a:prstGeom prst="rect">
             <a:avLst/>
           </a:prstGeom>
         </p:spPr>
       </p:pic>
-      <p:sp>
-        <p:nvSpPr>
-          <p:cNvPr id="5" name="文本框 4">
-            <a:extLst>
-              <a:ext uri="{FF2B5EF4-FFF2-40B4-BE49-F238E27FC236}">
-                <a16:creationId xmlns:a16="http://schemas.microsoft.com/office/drawing/2014/main" id="{D0A38E90-3C30-4DBD-84FE-1302FB6A1AFC}"/>
-              </a:ext>
-            </a:extLst>
-          </p:cNvPr>
-          <p:cNvSpPr txBox="1"/>
-          <p:nvPr/>
-        </p:nvSpPr>
-        <p:spPr>
-          <a:xfrm>
-            <a:off x="6791325" y="1806476"/>
-            <a:ext cx="5012747" cy="2031325"/>
-          </a:xfrm>
-          <a:prstGeom prst="rect">
-            <a:avLst/>
-          </a:prstGeom>
-          <a:noFill/>
-        </p:spPr>
-        <p:txBody>
-          <a:bodyPr wrap="square" rtlCol="0">
-            <a:spAutoFit/>
-          </a:bodyPr>
-          <a:lstStyle/>
-          <a:p>
-            <a:r>
-              <a:rPr lang="zh-CN" altLang="en-US" dirty="0"/>
-              <a:t>案例：</a:t>
-            </a:r>
-            <a:endParaRPr lang="en-US" altLang="zh-CN" dirty="0"/>
-          </a:p>
-          <a:p>
-            <a:r>
-              <a:rPr lang="zh-CN" altLang="en-US" dirty="0"/>
-              <a:t>公路局正在治理解放大道路面积水问题</a:t>
-            </a:r>
-            <a:endParaRPr lang="en-US" altLang="zh-CN" dirty="0"/>
-          </a:p>
-          <a:p>
-            <a:r>
-              <a:rPr lang="zh-CN" altLang="en-US" dirty="0"/>
-              <a:t>最小颗粒度分词：</a:t>
-            </a:r>
-            <a:endParaRPr lang="en-US" altLang="zh-CN" dirty="0"/>
-          </a:p>
-          <a:p>
-            <a:r>
-              <a:rPr lang="zh-CN" altLang="en-US" dirty="0"/>
-              <a:t>公路局</a:t>
-            </a:r>
-            <a:r>
-              <a:rPr lang="en-US" altLang="zh-CN" dirty="0"/>
-              <a:t>|</a:t>
-            </a:r>
-            <a:r>
-              <a:rPr lang="zh-CN" altLang="en-US" dirty="0"/>
-              <a:t>公路</a:t>
-            </a:r>
-            <a:r>
-              <a:rPr lang="en-US" altLang="zh-CN" dirty="0"/>
-              <a:t>|</a:t>
-            </a:r>
-            <a:r>
-              <a:rPr lang="zh-CN" altLang="en-US" dirty="0"/>
-              <a:t>路局</a:t>
-            </a:r>
-            <a:r>
-              <a:rPr lang="en-US" altLang="zh-CN" dirty="0"/>
-              <a:t>|</a:t>
-            </a:r>
-            <a:r>
-              <a:rPr lang="zh-CN" altLang="en-US" dirty="0"/>
-              <a:t>正在</a:t>
-            </a:r>
-            <a:r>
-              <a:rPr lang="en-US" altLang="zh-CN" dirty="0"/>
-              <a:t>|</a:t>
-            </a:r>
-            <a:r>
-              <a:rPr lang="zh-CN" altLang="en-US" dirty="0"/>
-              <a:t>治理</a:t>
-            </a:r>
-            <a:r>
-              <a:rPr lang="en-US" altLang="zh-CN" dirty="0"/>
-              <a:t>|</a:t>
-            </a:r>
-            <a:r>
-              <a:rPr lang="zh-CN" altLang="en-US" dirty="0"/>
-              <a:t>理解</a:t>
-            </a:r>
-            <a:r>
-              <a:rPr lang="en-US" altLang="zh-CN" dirty="0"/>
-              <a:t>|</a:t>
-            </a:r>
-            <a:r>
-              <a:rPr lang="zh-CN" altLang="en-US" dirty="0"/>
-              <a:t>解放</a:t>
-            </a:r>
-            <a:r>
-              <a:rPr lang="en-US" altLang="zh-CN" dirty="0"/>
-              <a:t>|</a:t>
-            </a:r>
-            <a:r>
-              <a:rPr lang="zh-CN" altLang="en-US" dirty="0"/>
-              <a:t>放大</a:t>
-            </a:r>
-            <a:r>
-              <a:rPr lang="en-US" altLang="zh-CN" dirty="0"/>
-              <a:t>|</a:t>
-            </a:r>
-            <a:r>
-              <a:rPr lang="zh-CN" altLang="en-US" dirty="0"/>
-              <a:t>大道</a:t>
-            </a:r>
-            <a:r>
-              <a:rPr lang="en-US" altLang="zh-CN" dirty="0"/>
-              <a:t>|</a:t>
-            </a:r>
-            <a:r>
-              <a:rPr lang="zh-CN" altLang="en-US" dirty="0"/>
-              <a:t>道路</a:t>
-            </a:r>
-            <a:r>
-              <a:rPr lang="en-US" altLang="zh-CN" dirty="0"/>
-              <a:t>|</a:t>
-            </a:r>
-            <a:r>
-              <a:rPr lang="zh-CN" altLang="en-US" dirty="0"/>
-              <a:t>路面</a:t>
-            </a:r>
-            <a:r>
-              <a:rPr lang="en-US" altLang="zh-CN" dirty="0"/>
-              <a:t>|</a:t>
-            </a:r>
-            <a:r>
-              <a:rPr lang="zh-CN" altLang="en-US" dirty="0"/>
-              <a:t>面积</a:t>
-            </a:r>
-            <a:r>
-              <a:rPr lang="en-US" altLang="zh-CN" dirty="0"/>
-              <a:t>|</a:t>
-            </a:r>
-            <a:r>
-              <a:rPr lang="zh-CN" altLang="en-US" dirty="0"/>
-              <a:t>积水</a:t>
-            </a:r>
-            <a:r>
-              <a:rPr lang="en-US" altLang="zh-CN" dirty="0"/>
-              <a:t>|</a:t>
-            </a:r>
-            <a:r>
-              <a:rPr lang="zh-CN" altLang="en-US" dirty="0"/>
-              <a:t>问题</a:t>
-            </a:r>
-            <a:endParaRPr lang="en-US" altLang="zh-CN" dirty="0"/>
-          </a:p>
-          <a:p>
-            <a:r>
-              <a:rPr lang="zh-CN" altLang="en-US" dirty="0"/>
-              <a:t>只能分词模式：</a:t>
-            </a:r>
-            <a:endParaRPr lang="en-US" altLang="zh-CN" dirty="0"/>
-          </a:p>
-          <a:p>
-            <a:r>
-              <a:rPr lang="zh-CN" altLang="en-US" dirty="0"/>
-              <a:t>公路局</a:t>
-            </a:r>
-            <a:r>
-              <a:rPr lang="en-US" altLang="zh-CN" dirty="0"/>
-              <a:t>|</a:t>
-            </a:r>
-            <a:r>
-              <a:rPr lang="zh-CN" altLang="en-US" dirty="0"/>
-              <a:t>正在</a:t>
-            </a:r>
-            <a:r>
-              <a:rPr lang="en-US" altLang="zh-CN" dirty="0"/>
-              <a:t>|</a:t>
-            </a:r>
-            <a:r>
-              <a:rPr lang="zh-CN" altLang="en-US" dirty="0"/>
-              <a:t>治理</a:t>
-            </a:r>
-            <a:r>
-              <a:rPr lang="en-US" altLang="zh-CN" dirty="0"/>
-              <a:t>|</a:t>
-            </a:r>
-            <a:r>
-              <a:rPr lang="zh-CN" altLang="en-US" dirty="0"/>
-              <a:t>解放</a:t>
-            </a:r>
-            <a:r>
-              <a:rPr lang="en-US" altLang="zh-CN" dirty="0"/>
-              <a:t>|</a:t>
-            </a:r>
-            <a:r>
-              <a:rPr lang="zh-CN" altLang="en-US" dirty="0"/>
-              <a:t>大道</a:t>
-            </a:r>
-            <a:r>
-              <a:rPr lang="en-US" altLang="zh-CN" dirty="0"/>
-              <a:t>|</a:t>
-            </a:r>
-            <a:r>
-              <a:rPr lang="zh-CN" altLang="en-US" dirty="0"/>
-              <a:t>路面</a:t>
-            </a:r>
-            <a:r>
-              <a:rPr lang="en-US" altLang="zh-CN" dirty="0"/>
-              <a:t>|</a:t>
-            </a:r>
-            <a:r>
-              <a:rPr lang="zh-CN" altLang="en-US" dirty="0"/>
-              <a:t>积水</a:t>
-            </a:r>
-            <a:r>
-              <a:rPr lang="en-US" altLang="zh-CN" dirty="0"/>
-              <a:t>|</a:t>
-            </a:r>
-            <a:r>
-              <a:rPr lang="zh-CN" altLang="en-US" dirty="0"/>
-              <a:t>问题</a:t>
-            </a:r>
-          </a:p>
-        </p:txBody>
-      </p:sp>
     </p:spTree>
   </p:cSld>
   <p:clrMapOvr>
@@ -5505,7 +5321,7 @@
           <a:p>
             <a:r>
               <a:rPr lang="zh-CN" altLang="en-US" dirty="0"/>
-              <a:t>查询系统</a:t>
+              <a:t>分词器</a:t>
             </a:r>
           </a:p>
         </p:txBody>
@@ -5523,21 +5339,376 @@
         <p:spPr>
           <a:xfrm>
             <a:off x="1069848" y="2121408"/>
-            <a:ext cx="7749956" cy="4050792"/>
+            <a:ext cx="5721650" cy="4050792"/>
           </a:xfrm>
         </p:spPr>
         <p:txBody>
           <a:bodyPr/>
           <a:lstStyle/>
           <a:p>
-            <a:pPr>
-              <a:lnSpc>
-                <a:spcPct val="200000"/>
-              </a:lnSpc>
-            </a:pPr>
-            <a:r>
-              <a:rPr lang="zh-CN" altLang="en-US" dirty="0"/>
-              <a:t>文档索引完成之后就可以对其进行搜索，当用户输入一个关键字，搜索引擎接收到后，并不是立刻就将它放到后台开始进行关键字的检索，而应当首先对这个关键字进行一定的分析和处理，这样才能够提高检索的效率，同时返回有效的结果。</a:t>
+            <a:r>
+              <a:rPr lang="zh-CN" altLang="en-US" dirty="0"/>
+              <a:t>在向索引库写入文档的时候，分词器会把指定的文本域进行分词，然后对其建立索引并写入索引库中</a:t>
+            </a:r>
+            <a:endParaRPr lang="en-US" altLang="zh-CN" dirty="0"/>
+          </a:p>
+          <a:p>
+            <a:r>
+              <a:rPr lang="zh-CN" altLang="en-US" dirty="0"/>
+              <a:t>标准分词器：</a:t>
+            </a:r>
+            <a:r>
+              <a:rPr lang="en-US" altLang="zh-CN" dirty="0" err="1"/>
+              <a:t>StandardAnalyzer</a:t>
+            </a:r>
+            <a:r>
+              <a:rPr lang="en-US" altLang="zh-CN" dirty="0"/>
+              <a:t> </a:t>
+            </a:r>
+            <a:r>
+              <a:rPr lang="zh-CN" altLang="en-US" dirty="0"/>
+              <a:t>该分词器对英文支持比较好，但中文的支持很差。</a:t>
+            </a:r>
+            <a:endParaRPr lang="en-US" altLang="zh-CN" dirty="0"/>
+          </a:p>
+          <a:p>
+            <a:r>
+              <a:rPr lang="en-US" altLang="zh-CN" dirty="0"/>
+              <a:t>IK</a:t>
+            </a:r>
+            <a:r>
+              <a:rPr lang="zh-CN" altLang="en-US" dirty="0"/>
+              <a:t>分词器：</a:t>
+            </a:r>
+            <a:r>
+              <a:rPr lang="en-US" altLang="zh-CN" dirty="0" err="1"/>
+              <a:t>IKAnalyzer</a:t>
+            </a:r>
+            <a:r>
+              <a:rPr lang="en-US" altLang="zh-CN" dirty="0"/>
+              <a:t> IK</a:t>
+            </a:r>
+            <a:r>
+              <a:rPr lang="zh-CN" altLang="en-US" dirty="0"/>
+              <a:t>分词器是一个开源的、基于</a:t>
+            </a:r>
+            <a:r>
+              <a:rPr lang="en-US" altLang="zh-CN" dirty="0"/>
+              <a:t>Java</a:t>
+            </a:r>
+            <a:r>
+              <a:rPr lang="zh-CN" altLang="en-US" dirty="0"/>
+              <a:t>语言开发的轻量级中文分词器，对中文友好并支持智能分词模式；但是</a:t>
+            </a:r>
+            <a:r>
+              <a:rPr lang="en-US" altLang="zh-CN" dirty="0" err="1"/>
+              <a:t>IKAnalyzer</a:t>
+            </a:r>
+            <a:r>
+              <a:rPr lang="zh-CN" altLang="en-US" dirty="0"/>
+              <a:t>最后一个版本是</a:t>
+            </a:r>
+            <a:r>
+              <a:rPr lang="en-US" altLang="zh-CN" dirty="0"/>
+              <a:t>2012</a:t>
+            </a:r>
+            <a:r>
+              <a:rPr lang="zh-CN" altLang="en-US" dirty="0"/>
+              <a:t>年发布的，对现在的</a:t>
+            </a:r>
+            <a:r>
+              <a:rPr lang="en-US" altLang="zh-CN" dirty="0"/>
+              <a:t>Lucene</a:t>
+            </a:r>
+            <a:r>
+              <a:rPr lang="zh-CN" altLang="en-US" dirty="0"/>
+              <a:t>新版本不适用。所以我们查看了</a:t>
+            </a:r>
+            <a:r>
+              <a:rPr lang="en-US" altLang="zh-CN" dirty="0"/>
+              <a:t>Lucene</a:t>
+            </a:r>
+            <a:r>
+              <a:rPr lang="zh-CN" altLang="en-US" dirty="0"/>
+              <a:t>相关源码，在</a:t>
+            </a:r>
+            <a:r>
+              <a:rPr lang="en-US" altLang="zh-CN" dirty="0" err="1"/>
+              <a:t>IKAnalyzer</a:t>
+            </a:r>
+            <a:r>
+              <a:rPr lang="zh-CN" altLang="en-US" dirty="0"/>
+              <a:t>源码的基础上实现了最新版</a:t>
+            </a:r>
+            <a:r>
+              <a:rPr lang="en-US" altLang="zh-CN" dirty="0"/>
+              <a:t>Lucene</a:t>
+            </a:r>
+            <a:r>
+              <a:rPr lang="zh-CN" altLang="en-US" dirty="0"/>
+              <a:t>的接口，从而使</a:t>
+            </a:r>
+            <a:r>
+              <a:rPr lang="en-US" altLang="zh-CN" dirty="0"/>
+              <a:t>IK</a:t>
+            </a:r>
+            <a:r>
+              <a:rPr lang="zh-CN" altLang="en-US" dirty="0"/>
+              <a:t>分词器能够运行</a:t>
+            </a:r>
+          </a:p>
+        </p:txBody>
+      </p:sp>
+      <p:pic>
+        <p:nvPicPr>
+          <p:cNvPr id="4" name="图片 3"/>
+          <p:cNvPicPr>
+            <a:picLocks noChangeAspect="1"/>
+          </p:cNvPicPr>
+          <p:nvPr/>
+        </p:nvPicPr>
+        <p:blipFill>
+          <a:blip r:embed="rId2"/>
+          <a:stretch>
+            <a:fillRect/>
+          </a:stretch>
+        </p:blipFill>
+        <p:spPr>
+          <a:xfrm>
+            <a:off x="6791325" y="4114800"/>
+            <a:ext cx="5373370" cy="1633220"/>
+          </a:xfrm>
+          <a:prstGeom prst="rect">
+            <a:avLst/>
+          </a:prstGeom>
+        </p:spPr>
+      </p:pic>
+      <p:sp>
+        <p:nvSpPr>
+          <p:cNvPr id="5" name="文本框 4">
+            <a:extLst>
+              <a:ext uri="{FF2B5EF4-FFF2-40B4-BE49-F238E27FC236}">
+                <a16:creationId xmlns:a16="http://schemas.microsoft.com/office/drawing/2014/main" id="{D0A38E90-3C30-4DBD-84FE-1302FB6A1AFC}"/>
+              </a:ext>
+            </a:extLst>
+          </p:cNvPr>
+          <p:cNvSpPr txBox="1"/>
+          <p:nvPr/>
+        </p:nvSpPr>
+        <p:spPr>
+          <a:xfrm>
+            <a:off x="6791325" y="1806476"/>
+            <a:ext cx="5012747" cy="2031325"/>
+          </a:xfrm>
+          <a:prstGeom prst="rect">
+            <a:avLst/>
+          </a:prstGeom>
+          <a:noFill/>
+        </p:spPr>
+        <p:txBody>
+          <a:bodyPr wrap="square" rtlCol="0">
+            <a:spAutoFit/>
+          </a:bodyPr>
+          <a:lstStyle/>
+          <a:p>
+            <a:r>
+              <a:rPr lang="zh-CN" altLang="en-US" dirty="0"/>
+              <a:t>案例：</a:t>
+            </a:r>
+            <a:endParaRPr lang="en-US" altLang="zh-CN" dirty="0"/>
+          </a:p>
+          <a:p>
+            <a:r>
+              <a:rPr lang="zh-CN" altLang="en-US" dirty="0"/>
+              <a:t>公路局正在治理解放大道路面积水问题</a:t>
+            </a:r>
+            <a:endParaRPr lang="en-US" altLang="zh-CN" dirty="0"/>
+          </a:p>
+          <a:p>
+            <a:r>
+              <a:rPr lang="zh-CN" altLang="en-US" dirty="0"/>
+              <a:t>最小颗粒度分词：</a:t>
+            </a:r>
+            <a:endParaRPr lang="en-US" altLang="zh-CN" dirty="0"/>
+          </a:p>
+          <a:p>
+            <a:r>
+              <a:rPr lang="zh-CN" altLang="en-US" dirty="0"/>
+              <a:t>公路局</a:t>
+            </a:r>
+            <a:r>
+              <a:rPr lang="en-US" altLang="zh-CN" dirty="0"/>
+              <a:t>|</a:t>
+            </a:r>
+            <a:r>
+              <a:rPr lang="zh-CN" altLang="en-US" dirty="0"/>
+              <a:t>公路</a:t>
+            </a:r>
+            <a:r>
+              <a:rPr lang="en-US" altLang="zh-CN" dirty="0"/>
+              <a:t>|</a:t>
+            </a:r>
+            <a:r>
+              <a:rPr lang="zh-CN" altLang="en-US" dirty="0"/>
+              <a:t>路局</a:t>
+            </a:r>
+            <a:r>
+              <a:rPr lang="en-US" altLang="zh-CN" dirty="0"/>
+              <a:t>|</a:t>
+            </a:r>
+            <a:r>
+              <a:rPr lang="zh-CN" altLang="en-US" dirty="0"/>
+              <a:t>正在</a:t>
+            </a:r>
+            <a:r>
+              <a:rPr lang="en-US" altLang="zh-CN" dirty="0"/>
+              <a:t>|</a:t>
+            </a:r>
+            <a:r>
+              <a:rPr lang="zh-CN" altLang="en-US" dirty="0"/>
+              <a:t>治理</a:t>
+            </a:r>
+            <a:r>
+              <a:rPr lang="en-US" altLang="zh-CN" dirty="0"/>
+              <a:t>|</a:t>
+            </a:r>
+            <a:r>
+              <a:rPr lang="zh-CN" altLang="en-US" dirty="0"/>
+              <a:t>理解</a:t>
+            </a:r>
+            <a:r>
+              <a:rPr lang="en-US" altLang="zh-CN" dirty="0"/>
+              <a:t>|</a:t>
+            </a:r>
+            <a:r>
+              <a:rPr lang="zh-CN" altLang="en-US" dirty="0"/>
+              <a:t>解放</a:t>
+            </a:r>
+            <a:r>
+              <a:rPr lang="en-US" altLang="zh-CN" dirty="0"/>
+              <a:t>|</a:t>
+            </a:r>
+            <a:r>
+              <a:rPr lang="zh-CN" altLang="en-US" dirty="0"/>
+              <a:t>放大</a:t>
+            </a:r>
+            <a:r>
+              <a:rPr lang="en-US" altLang="zh-CN" dirty="0"/>
+              <a:t>|</a:t>
+            </a:r>
+            <a:r>
+              <a:rPr lang="zh-CN" altLang="en-US" dirty="0"/>
+              <a:t>大道</a:t>
+            </a:r>
+            <a:r>
+              <a:rPr lang="en-US" altLang="zh-CN" dirty="0"/>
+              <a:t>|</a:t>
+            </a:r>
+            <a:r>
+              <a:rPr lang="zh-CN" altLang="en-US" dirty="0"/>
+              <a:t>道路</a:t>
+            </a:r>
+            <a:r>
+              <a:rPr lang="en-US" altLang="zh-CN" dirty="0"/>
+              <a:t>|</a:t>
+            </a:r>
+            <a:r>
+              <a:rPr lang="zh-CN" altLang="en-US" dirty="0"/>
+              <a:t>路面</a:t>
+            </a:r>
+            <a:r>
+              <a:rPr lang="en-US" altLang="zh-CN" dirty="0"/>
+              <a:t>|</a:t>
+            </a:r>
+            <a:r>
+              <a:rPr lang="zh-CN" altLang="en-US" dirty="0"/>
+              <a:t>面积</a:t>
+            </a:r>
+            <a:r>
+              <a:rPr lang="en-US" altLang="zh-CN" dirty="0"/>
+              <a:t>|</a:t>
+            </a:r>
+            <a:r>
+              <a:rPr lang="zh-CN" altLang="en-US" dirty="0"/>
+              <a:t>积水</a:t>
+            </a:r>
+            <a:r>
+              <a:rPr lang="en-US" altLang="zh-CN" dirty="0"/>
+              <a:t>|</a:t>
+            </a:r>
+            <a:r>
+              <a:rPr lang="zh-CN" altLang="en-US" dirty="0"/>
+              <a:t>问题</a:t>
+            </a:r>
+            <a:endParaRPr lang="en-US" altLang="zh-CN" dirty="0"/>
+          </a:p>
+          <a:p>
+            <a:r>
+              <a:rPr lang="zh-CN" altLang="en-US" dirty="0"/>
+              <a:t>只能分词模式：</a:t>
+            </a:r>
+            <a:endParaRPr lang="en-US" altLang="zh-CN" dirty="0"/>
+          </a:p>
+          <a:p>
+            <a:r>
+              <a:rPr lang="zh-CN" altLang="en-US" dirty="0"/>
+              <a:t>公路局</a:t>
+            </a:r>
+            <a:r>
+              <a:rPr lang="en-US" altLang="zh-CN" dirty="0"/>
+              <a:t>|</a:t>
+            </a:r>
+            <a:r>
+              <a:rPr lang="zh-CN" altLang="en-US" dirty="0"/>
+              <a:t>正在</a:t>
+            </a:r>
+            <a:r>
+              <a:rPr lang="en-US" altLang="zh-CN" dirty="0"/>
+              <a:t>|</a:t>
+            </a:r>
+            <a:r>
+              <a:rPr lang="zh-CN" altLang="en-US" dirty="0"/>
+              <a:t>治理</a:t>
+            </a:r>
+            <a:r>
+              <a:rPr lang="en-US" altLang="zh-CN" dirty="0"/>
+              <a:t>|</a:t>
+            </a:r>
+            <a:r>
+              <a:rPr lang="zh-CN" altLang="en-US" dirty="0"/>
+              <a:t>解放</a:t>
+            </a:r>
+            <a:r>
+              <a:rPr lang="en-US" altLang="zh-CN" dirty="0"/>
+              <a:t>|</a:t>
+            </a:r>
+            <a:r>
+              <a:rPr lang="zh-CN" altLang="en-US" dirty="0"/>
+              <a:t>大道</a:t>
+            </a:r>
+            <a:r>
+              <a:rPr lang="en-US" altLang="zh-CN" dirty="0"/>
+              <a:t>|</a:t>
+            </a:r>
+            <a:r>
+              <a:rPr lang="zh-CN" altLang="en-US" dirty="0"/>
+              <a:t>路面</a:t>
+            </a:r>
+            <a:r>
+              <a:rPr lang="en-US" altLang="zh-CN" dirty="0"/>
+              <a:t>|</a:t>
+            </a:r>
+            <a:r>
+              <a:rPr lang="zh-CN" altLang="en-US" dirty="0"/>
+              <a:t>积水</a:t>
+            </a:r>
+            <a:r>
+              <a:rPr lang="en-US" altLang="zh-CN" dirty="0"/>
+              <a:t>|</a:t>
+            </a:r>
+            <a:r>
+              <a:rPr lang="zh-CN" altLang="en-US" dirty="0"/>
+              <a:t>问题</a:t>
             </a:r>
           </a:p>
         </p:txBody>
@@ -5584,35 +5755,43 @@
           <a:p>
             <a:r>
               <a:rPr lang="zh-CN" altLang="en-US" dirty="0"/>
-              <a:t>查询接口</a:t>
-            </a:r>
-          </a:p>
-        </p:txBody>
-      </p:sp>
-      <p:pic>
-        <p:nvPicPr>
-          <p:cNvPr id="3" name="图片 2"/>
-          <p:cNvPicPr>
-            <a:picLocks noChangeAspect="1"/>
-          </p:cNvPicPr>
-          <p:nvPr/>
-        </p:nvPicPr>
-        <p:blipFill>
-          <a:blip r:embed="rId2"/>
-          <a:stretch>
-            <a:fillRect/>
-          </a:stretch>
-        </p:blipFill>
-        <p:spPr>
-          <a:xfrm>
-            <a:off x="984885" y="1723390"/>
-            <a:ext cx="10076180" cy="5114290"/>
-          </a:xfrm>
-          <a:prstGeom prst="rect">
-            <a:avLst/>
-          </a:prstGeom>
-        </p:spPr>
-      </p:pic>
+              <a:t>查询系统</a:t>
+            </a:r>
+          </a:p>
+        </p:txBody>
+      </p:sp>
+      <p:sp>
+        <p:nvSpPr>
+          <p:cNvPr id="3" name="内容占位符 2"/>
+          <p:cNvSpPr>
+            <a:spLocks noGrp="1"/>
+          </p:cNvSpPr>
+          <p:nvPr>
+            <p:ph idx="1"/>
+          </p:nvPr>
+        </p:nvSpPr>
+        <p:spPr>
+          <a:xfrm>
+            <a:off x="1069848" y="2121408"/>
+            <a:ext cx="7749956" cy="4050792"/>
+          </a:xfrm>
+        </p:spPr>
+        <p:txBody>
+          <a:bodyPr/>
+          <a:lstStyle/>
+          <a:p>
+            <a:pPr>
+              <a:lnSpc>
+                <a:spcPct val="200000"/>
+              </a:lnSpc>
+            </a:pPr>
+            <a:r>
+              <a:rPr lang="zh-CN" altLang="en-US" dirty="0"/>
+              <a:t>文档索引完成之后就可以对其进行搜索，当用户输入一个关键字，搜索引擎接收到后，并不是立刻就将它放到后台开始进行关键字的检索，而应当首先对这个关键字进行一定的分析和处理，这样才能够提高检索的效率，同时返回有效的结果。</a:t>
+            </a:r>
+          </a:p>
+        </p:txBody>
+      </p:sp>
     </p:spTree>
   </p:cSld>
   <p:clrMapOvr>
@@ -5655,127 +5834,14 @@
           <a:p>
             <a:r>
               <a:rPr lang="zh-CN" altLang="en-US" dirty="0"/>
-              <a:t>查询的过程</a:t>
-            </a:r>
-          </a:p>
-        </p:txBody>
-      </p:sp>
-      <p:sp>
-        <p:nvSpPr>
-          <p:cNvPr id="3" name="内容占位符 2"/>
-          <p:cNvSpPr>
-            <a:spLocks noGrp="1"/>
-          </p:cNvSpPr>
-          <p:nvPr>
-            <p:ph idx="1"/>
-          </p:nvPr>
-        </p:nvSpPr>
-        <p:spPr>
-          <a:xfrm>
-            <a:off x="1069848" y="2121408"/>
-            <a:ext cx="6636050" cy="4050792"/>
-          </a:xfrm>
-        </p:spPr>
-        <p:txBody>
-          <a:bodyPr/>
-          <a:lstStyle/>
-          <a:p>
-            <a:r>
-              <a:rPr lang="zh-CN" altLang="en-US" dirty="0"/>
-              <a:t>在</a:t>
-            </a:r>
-            <a:r>
-              <a:rPr lang="en-US" altLang="zh-CN" dirty="0"/>
-              <a:t>Lucene</a:t>
-            </a:r>
-            <a:r>
-              <a:rPr lang="zh-CN" altLang="en-US" dirty="0"/>
-              <a:t>中，处理用户输入的查询关键词其实就是构建</a:t>
-            </a:r>
-            <a:r>
-              <a:rPr lang="en-US" altLang="zh-CN" dirty="0"/>
-              <a:t>Query</a:t>
-            </a:r>
-            <a:r>
-              <a:rPr lang="zh-CN" altLang="en-US" dirty="0"/>
-              <a:t>的过程。</a:t>
-            </a:r>
-            <a:endParaRPr lang="en-US" altLang="zh-CN" dirty="0"/>
-          </a:p>
-          <a:p>
-            <a:endParaRPr lang="en-US" altLang="zh-CN" dirty="0"/>
-          </a:p>
-          <a:p>
-            <a:r>
-              <a:rPr lang="en-US" altLang="zh-CN" dirty="0"/>
-              <a:t>Lucene</a:t>
-            </a:r>
-            <a:r>
-              <a:rPr lang="zh-CN" altLang="en-US" dirty="0"/>
-              <a:t>搜索文档需要实例化一个</a:t>
-            </a:r>
-            <a:r>
-              <a:rPr lang="en-US" altLang="zh-CN" dirty="0" err="1"/>
-              <a:t>IndexSearcher</a:t>
-            </a:r>
-            <a:r>
-              <a:rPr lang="zh-CN" altLang="en-US" dirty="0"/>
-              <a:t>对象。</a:t>
-            </a:r>
-            <a:endParaRPr lang="en-US" altLang="zh-CN" dirty="0"/>
-          </a:p>
-          <a:p>
-            <a:endParaRPr lang="en-US" altLang="zh-CN" dirty="0"/>
-          </a:p>
-          <a:p>
-            <a:r>
-              <a:rPr lang="en-US" altLang="zh-CN" dirty="0" err="1"/>
-              <a:t>IndexSearcher</a:t>
-            </a:r>
-            <a:r>
-              <a:rPr lang="zh-CN" altLang="en-US" dirty="0"/>
-              <a:t>对象的</a:t>
-            </a:r>
-            <a:r>
-              <a:rPr lang="en-US" altLang="zh-CN" dirty="0"/>
-              <a:t>search()</a:t>
-            </a:r>
-            <a:r>
-              <a:rPr lang="zh-CN" altLang="en-US" dirty="0"/>
-              <a:t>方法完成搜索过程。</a:t>
-            </a:r>
-            <a:endParaRPr lang="en-US" altLang="zh-CN" dirty="0"/>
-          </a:p>
-          <a:p>
-            <a:endParaRPr lang="en-US" altLang="zh-CN" dirty="0"/>
-          </a:p>
-          <a:p>
-            <a:r>
-              <a:rPr lang="zh-CN" altLang="en-US" dirty="0"/>
-              <a:t>搜索结果保存在一个</a:t>
-            </a:r>
-            <a:r>
-              <a:rPr lang="en-US" altLang="zh-CN" dirty="0" err="1"/>
-              <a:t>TopDocs</a:t>
-            </a:r>
-            <a:r>
-              <a:rPr lang="zh-CN" altLang="en-US" dirty="0"/>
-              <a:t>类型的文档集合中，遍历</a:t>
-            </a:r>
-            <a:r>
-              <a:rPr lang="en-US" altLang="zh-CN" dirty="0" err="1"/>
-              <a:t>TopDocs</a:t>
-            </a:r>
-            <a:r>
-              <a:rPr lang="zh-CN" altLang="en-US" dirty="0"/>
-              <a:t>集合即可得到文档信息</a:t>
+              <a:t>查询接口</a:t>
             </a:r>
           </a:p>
         </p:txBody>
       </p:sp>
       <p:pic>
         <p:nvPicPr>
-          <p:cNvPr id="4" name="图片 3"/>
+          <p:cNvPr id="3" name="图片 2"/>
           <p:cNvPicPr>
             <a:picLocks noChangeAspect="1"/>
           </p:cNvPicPr>
@@ -5789,32 +5855,8 @@
         </p:blipFill>
         <p:spPr>
           <a:xfrm>
-            <a:off x="7032625" y="2544445"/>
-            <a:ext cx="5069205" cy="436245"/>
-          </a:xfrm>
-          <a:prstGeom prst="rect">
-            <a:avLst/>
-          </a:prstGeom>
-        </p:spPr>
-      </p:pic>
-      <p:pic>
-        <p:nvPicPr>
-          <p:cNvPr id="5" name="图片 4"/>
-          <p:cNvPicPr>
-            <a:picLocks noChangeAspect="1"/>
-          </p:cNvPicPr>
-          <p:nvPr/>
-        </p:nvPicPr>
-        <p:blipFill>
-          <a:blip r:embed="rId3"/>
-          <a:stretch>
-            <a:fillRect/>
-          </a:stretch>
-        </p:blipFill>
-        <p:spPr>
-          <a:xfrm>
-            <a:off x="7032625" y="3667760"/>
-            <a:ext cx="5036820" cy="406400"/>
+            <a:off x="984885" y="1723390"/>
+            <a:ext cx="10076180" cy="5114290"/>
           </a:xfrm>
           <a:prstGeom prst="rect">
             <a:avLst/>
@@ -5863,7 +5905,7 @@
           <a:p>
             <a:r>
               <a:rPr lang="zh-CN" altLang="en-US" dirty="0"/>
-              <a:t>结果渲染</a:t>
+              <a:t>查询的过程</a:t>
             </a:r>
           </a:p>
         </p:txBody>
@@ -5881,44 +5923,109 @@
         <p:spPr>
           <a:xfrm>
             <a:off x="1069848" y="2121408"/>
-            <a:ext cx="6577861" cy="4050792"/>
+            <a:ext cx="6636050" cy="4050792"/>
           </a:xfrm>
         </p:spPr>
         <p:txBody>
           <a:bodyPr/>
           <a:lstStyle/>
           <a:p>
-            <a:pPr>
-              <a:lnSpc>
-                <a:spcPct val="200000"/>
-              </a:lnSpc>
-            </a:pPr>
-            <a:r>
-              <a:rPr lang="zh-CN" altLang="en-US" dirty="0"/>
-              <a:t>提供一个友好的结果展示界面也是一个搜索引擎所不能缺少的。在本次课程设计中，我们使用了</a:t>
+            <a:r>
+              <a:rPr lang="zh-CN" altLang="en-US" dirty="0"/>
+              <a:t>在</a:t>
+            </a:r>
+            <a:r>
+              <a:rPr lang="en-US" altLang="zh-CN" dirty="0"/>
+              <a:t>Lucene</a:t>
+            </a:r>
+            <a:r>
+              <a:rPr lang="zh-CN" altLang="en-US" dirty="0"/>
+              <a:t>中，处理用户输入的查询关键词其实就是构建</a:t>
+            </a:r>
+            <a:r>
+              <a:rPr lang="en-US" altLang="zh-CN" dirty="0"/>
+              <a:t>Query</a:t>
+            </a:r>
+            <a:r>
+              <a:rPr lang="zh-CN" altLang="en-US" dirty="0"/>
+              <a:t>的过程。</a:t>
+            </a:r>
+            <a:endParaRPr lang="en-US" altLang="zh-CN" dirty="0"/>
+          </a:p>
+          <a:p>
+            <a:endParaRPr lang="en-US" altLang="zh-CN" dirty="0"/>
+          </a:p>
+          <a:p>
+            <a:r>
+              <a:rPr lang="en-US" altLang="zh-CN" dirty="0"/>
+              <a:t>Lucene</a:t>
+            </a:r>
+            <a:r>
+              <a:rPr lang="zh-CN" altLang="en-US" dirty="0"/>
+              <a:t>搜索文档需要实例化一个</a:t>
             </a:r>
             <a:r>
               <a:rPr lang="en-US" altLang="zh-CN" dirty="0" err="1"/>
-              <a:t>JavaWeb</a:t>
-            </a:r>
-            <a:r>
-              <a:rPr lang="zh-CN" altLang="en-US" dirty="0"/>
-              <a:t>，通过</a:t>
-            </a:r>
+              <a:t>IndexSearcher</a:t>
+            </a:r>
+            <a:r>
+              <a:rPr lang="zh-CN" altLang="en-US" dirty="0"/>
+              <a:t>对象。</a:t>
+            </a:r>
+            <a:endParaRPr lang="en-US" altLang="zh-CN" dirty="0"/>
+          </a:p>
+          <a:p>
+            <a:endParaRPr lang="en-US" altLang="zh-CN" dirty="0"/>
+          </a:p>
+          <a:p>
             <a:r>
               <a:rPr lang="en-US" altLang="zh-CN" dirty="0" err="1"/>
-              <a:t>SpringBoot</a:t>
-            </a:r>
-            <a:r>
-              <a:rPr lang="zh-CN" altLang="en-US" dirty="0"/>
-              <a:t>搭建了一个搜索引擎后台，用户只需在浏览器中输入想要查询的信息，浏览器便会向后台发送请求，后台根据请求进行检索，将结果返回给前台，前台得到结果后进行渲染，最终以友好的界面展示给用户</a:t>
+              <a:t>IndexSearcher</a:t>
+            </a:r>
+            <a:r>
+              <a:rPr lang="zh-CN" altLang="en-US" dirty="0"/>
+              <a:t>对象的</a:t>
+            </a:r>
+            <a:r>
+              <a:rPr lang="en-US" altLang="zh-CN" dirty="0"/>
+              <a:t>search()</a:t>
+            </a:r>
+            <a:r>
+              <a:rPr lang="zh-CN" altLang="en-US" dirty="0"/>
+              <a:t>方法完成搜索过程。</a:t>
+            </a:r>
+            <a:endParaRPr lang="en-US" altLang="zh-CN" dirty="0"/>
+          </a:p>
+          <a:p>
+            <a:endParaRPr lang="en-US" altLang="zh-CN" dirty="0"/>
+          </a:p>
+          <a:p>
+            <a:r>
+              <a:rPr lang="zh-CN" altLang="en-US" dirty="0"/>
+              <a:t>搜索结果保存在一个</a:t>
+            </a:r>
+            <a:r>
+              <a:rPr lang="en-US" altLang="zh-CN" dirty="0" err="1"/>
+              <a:t>TopDocs</a:t>
+            </a:r>
+            <a:r>
+              <a:rPr lang="zh-CN" altLang="en-US" dirty="0"/>
+              <a:t>类型的文档集合中，遍历</a:t>
+            </a:r>
+            <a:r>
+              <a:rPr lang="en-US" altLang="zh-CN" dirty="0" err="1"/>
+              <a:t>TopDocs</a:t>
+            </a:r>
+            <a:r>
+              <a:rPr lang="zh-CN" altLang="en-US" dirty="0"/>
+              <a:t>集合即可得到文档信息</a:t>
             </a:r>
           </a:p>
         </p:txBody>
       </p:sp>
       <p:pic>
         <p:nvPicPr>
-          <p:cNvPr id="5" name="图片 4"/>
+          <p:cNvPr id="4" name="图片 3"/>
           <p:cNvPicPr>
             <a:picLocks noChangeAspect="1"/>
           </p:cNvPicPr>
@@ -5932,8 +6039,32 @@
         </p:blipFill>
         <p:spPr>
           <a:xfrm>
-            <a:off x="7647940" y="36195"/>
-            <a:ext cx="4481830" cy="6786245"/>
+            <a:off x="7032625" y="2544445"/>
+            <a:ext cx="5069205" cy="436245"/>
+          </a:xfrm>
+          <a:prstGeom prst="rect">
+            <a:avLst/>
+          </a:prstGeom>
+        </p:spPr>
+      </p:pic>
+      <p:pic>
+        <p:nvPicPr>
+          <p:cNvPr id="5" name="图片 4"/>
+          <p:cNvPicPr>
+            <a:picLocks noChangeAspect="1"/>
+          </p:cNvPicPr>
+          <p:nvPr/>
+        </p:nvPicPr>
+        <p:blipFill>
+          <a:blip r:embed="rId3"/>
+          <a:stretch>
+            <a:fillRect/>
+          </a:stretch>
+        </p:blipFill>
+        <p:spPr>
+          <a:xfrm>
+            <a:off x="7032625" y="3667760"/>
+            <a:ext cx="5036820" cy="406400"/>
           </a:xfrm>
           <a:prstGeom prst="rect">
             <a:avLst/>
@@ -6296,7 +6427,7 @@
           <a:p>
             <a:r>
               <a:rPr lang="zh-CN" altLang="en-US" dirty="0"/>
-              <a:t>查询高亮</a:t>
+              <a:t>结果渲染</a:t>
             </a:r>
           </a:p>
         </p:txBody>
@@ -6314,184 +6445,37 @@
         <p:spPr>
           <a:xfrm>
             <a:off x="1069848" y="2121408"/>
-            <a:ext cx="5156385" cy="4050792"/>
+            <a:ext cx="6577861" cy="4050792"/>
           </a:xfrm>
         </p:spPr>
         <p:txBody>
           <a:bodyPr/>
           <a:lstStyle/>
           <a:p>
-            <a:r>
-              <a:rPr lang="zh-CN" altLang="en-US" dirty="0"/>
-              <a:t>在一个全文检索系统中，查询结果的高亮显示的功能尤为重要，它可以帮助用于快速的找到自己想要的结果，从而减少了用于自己寻找的时间，在一定程度上大大的提高了用户的体验性和友好度。</a:t>
-            </a:r>
-            <a:endParaRPr lang="en-US" altLang="zh-CN" dirty="0"/>
-          </a:p>
-          <a:p>
-            <a:r>
-              <a:rPr lang="zh-CN" altLang="en-US" dirty="0"/>
-              <a:t>在</a:t>
-            </a:r>
-            <a:r>
-              <a:rPr lang="en-US" altLang="zh-CN" dirty="0"/>
-              <a:t>Lucene</a:t>
-            </a:r>
-            <a:r>
-              <a:rPr lang="zh-CN" altLang="en-US" dirty="0"/>
-              <a:t>中，可以使用</a:t>
+            <a:pPr>
+              <a:lnSpc>
+                <a:spcPct val="200000"/>
+              </a:lnSpc>
+            </a:pPr>
+            <a:r>
+              <a:rPr lang="zh-CN" altLang="en-US" dirty="0"/>
+              <a:t>提供一个友好的结果展示界面也是一个搜索引擎所不能缺少的。在本次课程设计中，我们使用了</a:t>
             </a:r>
             <a:r>
               <a:rPr lang="en-US" altLang="zh-CN" dirty="0" err="1"/>
-              <a:t>HighLighter</a:t>
-            </a:r>
-            <a:r>
-              <a:rPr lang="zh-CN" altLang="en-US" dirty="0"/>
-              <a:t>对象对文本进行高亮处理，通过</a:t>
+              <a:t>JavaWeb</a:t>
+            </a:r>
+            <a:r>
+              <a:rPr lang="zh-CN" altLang="en-US" dirty="0"/>
+              <a:t>，通过</a:t>
             </a:r>
             <a:r>
               <a:rPr lang="en-US" altLang="zh-CN" dirty="0" err="1"/>
-              <a:t>getBestFragment</a:t>
-            </a:r>
-            <a:r>
-              <a:rPr lang="zh-CN" altLang="en-US" dirty="0"/>
-              <a:t>得到结果，我们可以在关键词左右加上标签以便标红。</a:t>
-            </a:r>
-            <a:endParaRPr lang="en-US" altLang="zh-CN" dirty="0"/>
-          </a:p>
-          <a:p>
-            <a:r>
-              <a:rPr lang="zh-CN" altLang="en-US" dirty="0"/>
-              <a:t>我们可以实例化一个</a:t>
-            </a:r>
-            <a:r>
-              <a:rPr lang="en-US" altLang="zh-CN" dirty="0" err="1"/>
-              <a:t>SimpleHTMLFormatter</a:t>
-            </a:r>
-            <a:r>
-              <a:rPr lang="zh-CN" altLang="en-US" dirty="0"/>
-              <a:t>对象来指定要在关键词前后加入什么标记。</a:t>
-            </a:r>
-            <a:endParaRPr lang="en-US" altLang="zh-CN" dirty="0"/>
-          </a:p>
-        </p:txBody>
-      </p:sp>
-      <p:sp>
-        <p:nvSpPr>
-          <p:cNvPr id="4" name="文本框 3"/>
-          <p:cNvSpPr txBox="1"/>
-          <p:nvPr/>
-        </p:nvSpPr>
-        <p:spPr>
-          <a:xfrm>
-            <a:off x="6226233" y="1634790"/>
-            <a:ext cx="5877098" cy="1015663"/>
-          </a:xfrm>
-          <a:prstGeom prst="rect">
-            <a:avLst/>
-          </a:prstGeom>
-          <a:noFill/>
-        </p:spPr>
-        <p:txBody>
-          <a:bodyPr wrap="square" rtlCol="0">
-            <a:spAutoFit/>
-          </a:bodyPr>
-          <a:lstStyle/>
-          <a:p>
-            <a:r>
-              <a:rPr lang="en-US" altLang="zh-CN" sz="1200" dirty="0" err="1">
-                <a:latin typeface="Consolas" panose="020B0609020204030204" pitchFamily="49" charset="0"/>
-              </a:rPr>
-              <a:t>SimpleHTMLFormatter</a:t>
-            </a:r>
-            <a:r>
-              <a:rPr lang="en-US" altLang="zh-CN" sz="1200" dirty="0">
-                <a:latin typeface="Consolas" panose="020B0609020204030204" pitchFamily="49" charset="0"/>
-              </a:rPr>
-              <a:t> formatter = new </a:t>
-            </a:r>
-            <a:r>
-              <a:rPr lang="en-US" altLang="zh-CN" sz="1200" dirty="0" err="1">
-                <a:latin typeface="Consolas" panose="020B0609020204030204" pitchFamily="49" charset="0"/>
-              </a:rPr>
-              <a:t>SimpleHTMLFormatter</a:t>
-            </a:r>
-            <a:r>
-              <a:rPr lang="en-US" altLang="zh-CN" sz="1200" dirty="0">
-                <a:latin typeface="Consolas" panose="020B0609020204030204" pitchFamily="49" charset="0"/>
-              </a:rPr>
-              <a:t>(“&lt;span style=\”</a:t>
-            </a:r>
-            <a:r>
-              <a:rPr lang="en-US" altLang="zh-CN" sz="1200" dirty="0" err="1">
-                <a:latin typeface="Consolas" panose="020B0609020204030204" pitchFamily="49" charset="0"/>
-              </a:rPr>
-              <a:t>color:red</a:t>
-            </a:r>
-            <a:r>
-              <a:rPr lang="en-US" altLang="zh-CN" sz="1200" dirty="0">
-                <a:latin typeface="Consolas" panose="020B0609020204030204" pitchFamily="49" charset="0"/>
-              </a:rPr>
-              <a:t>;\”&gt;”, “&lt;/span&gt;”);</a:t>
-            </a:r>
-          </a:p>
-          <a:p>
-            <a:r>
-              <a:rPr lang="en-US" altLang="zh-CN" sz="1200" dirty="0">
-                <a:latin typeface="Consolas" panose="020B0609020204030204" pitchFamily="49" charset="0"/>
-              </a:rPr>
-              <a:t>Highlighter </a:t>
-            </a:r>
-            <a:r>
-              <a:rPr lang="en-US" altLang="zh-CN" sz="1200" dirty="0" err="1">
-                <a:latin typeface="Consolas" panose="020B0609020204030204" pitchFamily="49" charset="0"/>
-              </a:rPr>
-              <a:t>highlighter</a:t>
-            </a:r>
-            <a:r>
-              <a:rPr lang="en-US" altLang="zh-CN" sz="1200" dirty="0">
-                <a:latin typeface="Consolas" panose="020B0609020204030204" pitchFamily="49" charset="0"/>
-              </a:rPr>
-              <a:t> = new Highlighter(formatter, score);</a:t>
-            </a:r>
-          </a:p>
-          <a:p>
-            <a:r>
-              <a:rPr lang="en-US" altLang="zh-CN" sz="1200" dirty="0">
-                <a:latin typeface="Consolas" panose="020B0609020204030204" pitchFamily="49" charset="0"/>
-              </a:rPr>
-              <a:t>……</a:t>
-            </a:r>
-          </a:p>
-          <a:p>
-            <a:r>
-              <a:rPr lang="en-US" altLang="zh-CN" sz="1200" dirty="0">
-                <a:latin typeface="Consolas" panose="020B0609020204030204" pitchFamily="49" charset="0"/>
-              </a:rPr>
-              <a:t>String result = </a:t>
-            </a:r>
-            <a:r>
-              <a:rPr lang="en-US" altLang="zh-CN" sz="1200" dirty="0" err="1">
-                <a:latin typeface="Consolas" panose="020B0609020204030204" pitchFamily="49" charset="0"/>
-              </a:rPr>
-              <a:t>highlighter.getBestFragment</a:t>
-            </a:r>
-            <a:r>
-              <a:rPr lang="en-US" altLang="zh-CN" sz="1200" dirty="0">
-                <a:latin typeface="Consolas" panose="020B0609020204030204" pitchFamily="49" charset="0"/>
-              </a:rPr>
-              <a:t>(</a:t>
-            </a:r>
-            <a:r>
-              <a:rPr lang="en-US" altLang="zh-CN" sz="1200" dirty="0" err="1">
-                <a:latin typeface="Consolas" panose="020B0609020204030204" pitchFamily="49" charset="0"/>
-              </a:rPr>
-              <a:t>tokenStream</a:t>
-            </a:r>
-            <a:r>
-              <a:rPr lang="en-US" altLang="zh-CN" sz="1200" dirty="0">
-                <a:latin typeface="Consolas" panose="020B0609020204030204" pitchFamily="49" charset="0"/>
-              </a:rPr>
-              <a:t>, content);</a:t>
+              <a:t>SpringBoot</a:t>
+            </a:r>
+            <a:r>
+              <a:rPr lang="zh-CN" altLang="en-US" dirty="0"/>
+              <a:t>搭建了一个搜索引擎后台，用户只需在浏览器中输入想要查询的信息，浏览器便会向后台发送请求，后台根据请求进行检索，将结果返回给前台，前台得到结果后进行渲染，最终以友好的界面展示给用户</a:t>
             </a:r>
           </a:p>
         </p:txBody>
@@ -6512,8 +6496,8 @@
         </p:blipFill>
         <p:spPr>
           <a:xfrm>
-            <a:off x="6226175" y="3672840"/>
-            <a:ext cx="5847715" cy="1809750"/>
+            <a:off x="7647940" y="36195"/>
+            <a:ext cx="4481830" cy="6786245"/>
           </a:xfrm>
           <a:prstGeom prst="rect">
             <a:avLst/>
@@ -6529,6 +6513,272 @@
 </file>
 
 <file path=ppt/slides/slide21.xml><?xml version="1.0" encoding="utf-8"?>
+<p:sld xmlns:a="http://schemas.openxmlformats.org/drawingml/2006/main" xmlns:r="http://schemas.openxmlformats.org/officeDocument/2006/relationships" xmlns:p="http://schemas.openxmlformats.org/presentationml/2006/main">
+  <p:cSld>
+    <p:spTree>
+      <p:nvGrpSpPr>
+        <p:cNvPr id="1" name=""/>
+        <p:cNvGrpSpPr/>
+        <p:nvPr/>
+      </p:nvGrpSpPr>
+      <p:grpSpPr>
+        <a:xfrm>
+          <a:off x="0" y="0"/>
+          <a:ext cx="0" cy="0"/>
+          <a:chOff x="0" y="0"/>
+          <a:chExt cx="0" cy="0"/>
+        </a:xfrm>
+      </p:grpSpPr>
+      <p:sp>
+        <p:nvSpPr>
+          <p:cNvPr id="2" name="标题 1"/>
+          <p:cNvSpPr>
+            <a:spLocks noGrp="1"/>
+          </p:cNvSpPr>
+          <p:nvPr>
+            <p:ph type="title"/>
+          </p:nvPr>
+        </p:nvSpPr>
+        <p:spPr/>
+        <p:txBody>
+          <a:bodyPr/>
+          <a:lstStyle/>
+          <a:p>
+            <a:r>
+              <a:rPr lang="zh-CN" altLang="en-US" dirty="0"/>
+              <a:t>查询高亮</a:t>
+            </a:r>
+          </a:p>
+        </p:txBody>
+      </p:sp>
+      <p:sp>
+        <p:nvSpPr>
+          <p:cNvPr id="3" name="内容占位符 2"/>
+          <p:cNvSpPr>
+            <a:spLocks noGrp="1"/>
+          </p:cNvSpPr>
+          <p:nvPr>
+            <p:ph idx="1"/>
+          </p:nvPr>
+        </p:nvSpPr>
+        <p:spPr>
+          <a:xfrm>
+            <a:off x="1069848" y="2121408"/>
+            <a:ext cx="5156385" cy="4050792"/>
+          </a:xfrm>
+        </p:spPr>
+        <p:txBody>
+          <a:bodyPr/>
+          <a:lstStyle/>
+          <a:p>
+            <a:r>
+              <a:rPr lang="zh-CN" altLang="en-US" dirty="0"/>
+              <a:t>在一个全文检索系统中，查询结果的高亮显示的功能尤为重要，它可以帮助用于快速的找到自己想要的结果，从而减少了用于自己寻找的时间，在一定程度上大大的提高了用户的体验性和友好度。</a:t>
+            </a:r>
+            <a:endParaRPr lang="en-US" altLang="zh-CN" dirty="0"/>
+          </a:p>
+          <a:p>
+            <a:r>
+              <a:rPr lang="zh-CN" altLang="en-US" dirty="0"/>
+              <a:t>在</a:t>
+            </a:r>
+            <a:r>
+              <a:rPr lang="en-US" altLang="zh-CN" dirty="0"/>
+              <a:t>Lucene</a:t>
+            </a:r>
+            <a:r>
+              <a:rPr lang="zh-CN" altLang="en-US" dirty="0"/>
+              <a:t>中，可以使用</a:t>
+            </a:r>
+            <a:r>
+              <a:rPr lang="en-US" altLang="zh-CN" dirty="0" err="1"/>
+              <a:t>HighLighter</a:t>
+            </a:r>
+            <a:r>
+              <a:rPr lang="zh-CN" altLang="en-US" dirty="0"/>
+              <a:t>对象对文本进行高亮处理，通过</a:t>
+            </a:r>
+            <a:r>
+              <a:rPr lang="en-US" altLang="zh-CN" dirty="0" err="1"/>
+              <a:t>getBestFragment</a:t>
+            </a:r>
+            <a:r>
+              <a:rPr lang="zh-CN" altLang="en-US" dirty="0"/>
+              <a:t>得到结果，我们可以在关键词左右加上标签以便标红。</a:t>
+            </a:r>
+            <a:endParaRPr lang="en-US" altLang="zh-CN" dirty="0"/>
+          </a:p>
+          <a:p>
+            <a:r>
+              <a:rPr lang="zh-CN" altLang="en-US" dirty="0"/>
+              <a:t>我们可以实例化一个</a:t>
+            </a:r>
+            <a:r>
+              <a:rPr lang="en-US" altLang="zh-CN" dirty="0" err="1"/>
+              <a:t>SimpleHTMLFormatter</a:t>
+            </a:r>
+            <a:r>
+              <a:rPr lang="zh-CN" altLang="en-US" dirty="0"/>
+              <a:t>对象来指定要在关键词前后加入什么标记。</a:t>
+            </a:r>
+            <a:endParaRPr lang="en-US" altLang="zh-CN" dirty="0"/>
+          </a:p>
+        </p:txBody>
+      </p:sp>
+      <p:sp>
+        <p:nvSpPr>
+          <p:cNvPr id="4" name="文本框 3"/>
+          <p:cNvSpPr txBox="1"/>
+          <p:nvPr/>
+        </p:nvSpPr>
+        <p:spPr>
+          <a:xfrm>
+            <a:off x="6226233" y="1634790"/>
+            <a:ext cx="5877098" cy="1015663"/>
+          </a:xfrm>
+          <a:prstGeom prst="rect">
+            <a:avLst/>
+          </a:prstGeom>
+          <a:noFill/>
+        </p:spPr>
+        <p:txBody>
+          <a:bodyPr wrap="square" rtlCol="0">
+            <a:spAutoFit/>
+          </a:bodyPr>
+          <a:lstStyle/>
+          <a:p>
+            <a:r>
+              <a:rPr lang="en-US" altLang="zh-CN" sz="1200" dirty="0" err="1">
+                <a:latin typeface="Consolas" panose="020B0609020204030204" pitchFamily="49" charset="0"/>
+              </a:rPr>
+              <a:t>SimpleHTMLFormatter</a:t>
+            </a:r>
+            <a:r>
+              <a:rPr lang="en-US" altLang="zh-CN" sz="1200" dirty="0">
+                <a:latin typeface="Consolas" panose="020B0609020204030204" pitchFamily="49" charset="0"/>
+              </a:rPr>
+              <a:t> formatter = new </a:t>
+            </a:r>
+            <a:r>
+              <a:rPr lang="en-US" altLang="zh-CN" sz="1200" dirty="0" err="1">
+                <a:latin typeface="Consolas" panose="020B0609020204030204" pitchFamily="49" charset="0"/>
+              </a:rPr>
+              <a:t>SimpleHTMLFormatter</a:t>
+            </a:r>
+            <a:r>
+              <a:rPr lang="en-US" altLang="zh-CN" sz="1200" dirty="0">
+                <a:latin typeface="Consolas" panose="020B0609020204030204" pitchFamily="49" charset="0"/>
+              </a:rPr>
+              <a:t>(“&lt;span style=\”</a:t>
+            </a:r>
+            <a:r>
+              <a:rPr lang="en-US" altLang="zh-CN" sz="1200" dirty="0" err="1">
+                <a:latin typeface="Consolas" panose="020B0609020204030204" pitchFamily="49" charset="0"/>
+              </a:rPr>
+              <a:t>color:red</a:t>
+            </a:r>
+            <a:r>
+              <a:rPr lang="en-US" altLang="zh-CN" sz="1200" dirty="0">
+                <a:latin typeface="Consolas" panose="020B0609020204030204" pitchFamily="49" charset="0"/>
+              </a:rPr>
+              <a:t>;\”&gt;”, “&lt;/span&gt;”);</a:t>
+            </a:r>
+          </a:p>
+          <a:p>
+            <a:r>
+              <a:rPr lang="en-US" altLang="zh-CN" sz="1200" dirty="0">
+                <a:latin typeface="Consolas" panose="020B0609020204030204" pitchFamily="49" charset="0"/>
+              </a:rPr>
+              <a:t>Highlighter </a:t>
+            </a:r>
+            <a:r>
+              <a:rPr lang="en-US" altLang="zh-CN" sz="1200" dirty="0" err="1">
+                <a:latin typeface="Consolas" panose="020B0609020204030204" pitchFamily="49" charset="0"/>
+              </a:rPr>
+              <a:t>highlighter</a:t>
+            </a:r>
+            <a:r>
+              <a:rPr lang="en-US" altLang="zh-CN" sz="1200" dirty="0">
+                <a:latin typeface="Consolas" panose="020B0609020204030204" pitchFamily="49" charset="0"/>
+              </a:rPr>
+              <a:t> = new Highlighter(formatter, score);</a:t>
+            </a:r>
+          </a:p>
+          <a:p>
+            <a:r>
+              <a:rPr lang="en-US" altLang="zh-CN" sz="1200" dirty="0">
+                <a:latin typeface="Consolas" panose="020B0609020204030204" pitchFamily="49" charset="0"/>
+              </a:rPr>
+              <a:t>……</a:t>
+            </a:r>
+          </a:p>
+          <a:p>
+            <a:r>
+              <a:rPr lang="en-US" altLang="zh-CN" sz="1200" dirty="0">
+                <a:latin typeface="Consolas" panose="020B0609020204030204" pitchFamily="49" charset="0"/>
+              </a:rPr>
+              <a:t>String result = </a:t>
+            </a:r>
+            <a:r>
+              <a:rPr lang="en-US" altLang="zh-CN" sz="1200" dirty="0" err="1">
+                <a:latin typeface="Consolas" panose="020B0609020204030204" pitchFamily="49" charset="0"/>
+              </a:rPr>
+              <a:t>highlighter.getBestFragment</a:t>
+            </a:r>
+            <a:r>
+              <a:rPr lang="en-US" altLang="zh-CN" sz="1200" dirty="0">
+                <a:latin typeface="Consolas" panose="020B0609020204030204" pitchFamily="49" charset="0"/>
+              </a:rPr>
+              <a:t>(</a:t>
+            </a:r>
+            <a:r>
+              <a:rPr lang="en-US" altLang="zh-CN" sz="1200" dirty="0" err="1">
+                <a:latin typeface="Consolas" panose="020B0609020204030204" pitchFamily="49" charset="0"/>
+              </a:rPr>
+              <a:t>tokenStream</a:t>
+            </a:r>
+            <a:r>
+              <a:rPr lang="en-US" altLang="zh-CN" sz="1200" dirty="0">
+                <a:latin typeface="Consolas" panose="020B0609020204030204" pitchFamily="49" charset="0"/>
+              </a:rPr>
+              <a:t>, content);</a:t>
+            </a:r>
+          </a:p>
+        </p:txBody>
+      </p:sp>
+      <p:pic>
+        <p:nvPicPr>
+          <p:cNvPr id="5" name="图片 4"/>
+          <p:cNvPicPr>
+            <a:picLocks noChangeAspect="1"/>
+          </p:cNvPicPr>
+          <p:nvPr/>
+        </p:nvPicPr>
+        <p:blipFill>
+          <a:blip r:embed="rId2"/>
+          <a:stretch>
+            <a:fillRect/>
+          </a:stretch>
+        </p:blipFill>
+        <p:spPr>
+          <a:xfrm>
+            <a:off x="6226175" y="3672840"/>
+            <a:ext cx="5847715" cy="1809750"/>
+          </a:xfrm>
+          <a:prstGeom prst="rect">
+            <a:avLst/>
+          </a:prstGeom>
+        </p:spPr>
+      </p:pic>
+    </p:spTree>
+  </p:cSld>
+  <p:clrMapOvr>
+    <a:masterClrMapping/>
+  </p:clrMapOvr>
+</p:sld>
+</file>
+
+<file path=ppt/slides/slide22.xml><?xml version="1.0" encoding="utf-8"?>
 <p:sld xmlns:a="http://schemas.openxmlformats.org/drawingml/2006/main" xmlns:r="http://schemas.openxmlformats.org/officeDocument/2006/relationships" xmlns:p="http://schemas.openxmlformats.org/presentationml/2006/main">
   <p:cSld>
     <p:spTree>
@@ -9686,7 +9936,13 @@
       </p:grpSpPr>
       <p:sp>
         <p:nvSpPr>
-          <p:cNvPr id="2" name="标题 1"/>
+          <p:cNvPr id="2" name="标题 1">
+            <a:extLst>
+              <a:ext uri="{FF2B5EF4-FFF2-40B4-BE49-F238E27FC236}">
+                <a16:creationId xmlns:a16="http://schemas.microsoft.com/office/drawing/2014/main" id="{8536ECC4-3BCB-489F-9648-98900DF673CE}"/>
+              </a:ext>
+            </a:extLst>
+          </p:cNvPr>
           <p:cNvSpPr>
             <a:spLocks noGrp="1"/>
           </p:cNvSpPr>
@@ -9694,26 +9950,24 @@
             <p:ph type="title"/>
           </p:nvPr>
         </p:nvSpPr>
-        <p:spPr>
-          <a:xfrm>
-            <a:off x="1066800" y="365363"/>
-            <a:ext cx="10058400" cy="1609344"/>
-          </a:xfrm>
-        </p:spPr>
+        <p:spPr/>
         <p:txBody>
           <a:bodyPr/>
           <a:lstStyle/>
           <a:p>
-            <a:r>
-              <a:rPr lang="zh-CN" altLang="en-US" dirty="0"/>
-              <a:t>正文提取算法</a:t>
-            </a:r>
-          </a:p>
-        </p:txBody>
-      </p:sp>
-      <p:sp>
-        <p:nvSpPr>
-          <p:cNvPr id="3" name="内容占位符 2"/>
+            <a:endParaRPr lang="zh-CN" altLang="en-US"/>
+          </a:p>
+        </p:txBody>
+      </p:sp>
+      <p:sp>
+        <p:nvSpPr>
+          <p:cNvPr id="3" name="内容占位符 2">
+            <a:extLst>
+              <a:ext uri="{FF2B5EF4-FFF2-40B4-BE49-F238E27FC236}">
+                <a16:creationId xmlns:a16="http://schemas.microsoft.com/office/drawing/2014/main" id="{D61B07D4-C363-4678-919A-23AA75940D0C}"/>
+              </a:ext>
+            </a:extLst>
+          </p:cNvPr>
           <p:cNvSpPr>
             <a:spLocks noGrp="1"/>
           </p:cNvSpPr>
@@ -9721,33 +9975,236 @@
             <p:ph idx="1"/>
           </p:nvPr>
         </p:nvSpPr>
-        <p:spPr>
-          <a:xfrm>
-            <a:off x="1069848" y="1948070"/>
-            <a:ext cx="10058400" cy="4224130"/>
-          </a:xfrm>
-        </p:spPr>
+        <p:spPr/>
         <p:txBody>
           <a:bodyPr/>
           <a:lstStyle/>
           <a:p>
-            <a:r>
-              <a:rPr lang="zh-CN" altLang="en-US" dirty="0"/>
-              <a:t>基于字符密度算法改进</a:t>
-            </a:r>
-          </a:p>
-        </p:txBody>
-      </p:sp>
-      <p:sp>
-        <p:nvSpPr>
-          <p:cNvPr id="5" name="文本框 4"/>
+            <a:endParaRPr lang="zh-CN" altLang="en-US" dirty="0"/>
+          </a:p>
+        </p:txBody>
+      </p:sp>
+      <p:sp>
+        <p:nvSpPr>
+          <p:cNvPr id="4" name="椭圆 3">
+            <a:extLst>
+              <a:ext uri="{FF2B5EF4-FFF2-40B4-BE49-F238E27FC236}">
+                <a16:creationId xmlns:a16="http://schemas.microsoft.com/office/drawing/2014/main" id="{7E192CA0-51E4-4EB6-980A-44ECD75C1B4B}"/>
+              </a:ext>
+            </a:extLst>
+          </p:cNvPr>
+          <p:cNvSpPr/>
+          <p:nvPr/>
+        </p:nvSpPr>
+        <p:spPr>
+          <a:xfrm>
+            <a:off x="4386469" y="2622804"/>
+            <a:ext cx="2054087" cy="3048000"/>
+          </a:xfrm>
+          <a:prstGeom prst="ellipse">
+            <a:avLst/>
+          </a:prstGeom>
+        </p:spPr>
+        <p:style>
+          <a:lnRef idx="2">
+            <a:schemeClr val="accent1">
+              <a:shade val="50000"/>
+            </a:schemeClr>
+          </a:lnRef>
+          <a:fillRef idx="1">
+            <a:schemeClr val="accent1"/>
+          </a:fillRef>
+          <a:effectRef idx="0">
+            <a:schemeClr val="accent1"/>
+          </a:effectRef>
+          <a:fontRef idx="minor">
+            <a:schemeClr val="lt1"/>
+          </a:fontRef>
+        </p:style>
+        <p:txBody>
+          <a:bodyPr rtlCol="0" anchor="ctr"/>
+          <a:lstStyle/>
+          <a:p>
+            <a:pPr algn="ctr"/>
+            <a:r>
+              <a:rPr lang="zh-CN" altLang="en-US" dirty="0"/>
+              <a:t>分析</a:t>
+            </a:r>
+          </a:p>
+        </p:txBody>
+      </p:sp>
+      <p:cxnSp>
+        <p:nvCxnSpPr>
+          <p:cNvPr id="6" name="直接箭头连接符 5">
+            <a:extLst>
+              <a:ext uri="{FF2B5EF4-FFF2-40B4-BE49-F238E27FC236}">
+                <a16:creationId xmlns:a16="http://schemas.microsoft.com/office/drawing/2014/main" id="{666109B4-D448-467A-ACCF-2ABF97590102}"/>
+              </a:ext>
+            </a:extLst>
+          </p:cNvPr>
+          <p:cNvCxnSpPr/>
+          <p:nvPr/>
+        </p:nvCxnSpPr>
+        <p:spPr>
+          <a:xfrm>
+            <a:off x="1563757" y="3180522"/>
+            <a:ext cx="3061252" cy="0"/>
+          </a:xfrm>
+          <a:prstGeom prst="straightConnector1">
+            <a:avLst/>
+          </a:prstGeom>
+          <a:ln>
+            <a:tailEnd type="triangle"/>
+          </a:ln>
+        </p:spPr>
+        <p:style>
+          <a:lnRef idx="1">
+            <a:schemeClr val="accent1"/>
+          </a:lnRef>
+          <a:fillRef idx="0">
+            <a:schemeClr val="accent1"/>
+          </a:fillRef>
+          <a:effectRef idx="0">
+            <a:schemeClr val="accent1"/>
+          </a:effectRef>
+          <a:fontRef idx="minor">
+            <a:schemeClr val="tx1"/>
+          </a:fontRef>
+        </p:style>
+      </p:cxnSp>
+      <p:cxnSp>
+        <p:nvCxnSpPr>
+          <p:cNvPr id="9" name="直接箭头连接符 8">
+            <a:extLst>
+              <a:ext uri="{FF2B5EF4-FFF2-40B4-BE49-F238E27FC236}">
+                <a16:creationId xmlns:a16="http://schemas.microsoft.com/office/drawing/2014/main" id="{D606085C-E1A8-48E6-A143-449D2A2EDD0B}"/>
+              </a:ext>
+            </a:extLst>
+          </p:cNvPr>
+          <p:cNvCxnSpPr/>
+          <p:nvPr/>
+        </p:nvCxnSpPr>
+        <p:spPr>
+          <a:xfrm>
+            <a:off x="1325217" y="3770244"/>
+            <a:ext cx="3061252" cy="0"/>
+          </a:xfrm>
+          <a:prstGeom prst="straightConnector1">
+            <a:avLst/>
+          </a:prstGeom>
+          <a:ln>
+            <a:tailEnd type="triangle"/>
+          </a:ln>
+        </p:spPr>
+        <p:style>
+          <a:lnRef idx="1">
+            <a:schemeClr val="accent1"/>
+          </a:lnRef>
+          <a:fillRef idx="0">
+            <a:schemeClr val="accent1"/>
+          </a:fillRef>
+          <a:effectRef idx="0">
+            <a:schemeClr val="accent1"/>
+          </a:effectRef>
+          <a:fontRef idx="minor">
+            <a:schemeClr val="tx1"/>
+          </a:fontRef>
+        </p:style>
+      </p:cxnSp>
+      <p:cxnSp>
+        <p:nvCxnSpPr>
+          <p:cNvPr id="10" name="直接箭头连接符 9">
+            <a:extLst>
+              <a:ext uri="{FF2B5EF4-FFF2-40B4-BE49-F238E27FC236}">
+                <a16:creationId xmlns:a16="http://schemas.microsoft.com/office/drawing/2014/main" id="{5A126269-06BF-424D-BB9E-3CF18E5047D0}"/>
+              </a:ext>
+            </a:extLst>
+          </p:cNvPr>
+          <p:cNvCxnSpPr/>
+          <p:nvPr/>
+        </p:nvCxnSpPr>
+        <p:spPr>
+          <a:xfrm>
+            <a:off x="1325217" y="4565374"/>
+            <a:ext cx="3061252" cy="0"/>
+          </a:xfrm>
+          <a:prstGeom prst="straightConnector1">
+            <a:avLst/>
+          </a:prstGeom>
+          <a:ln>
+            <a:tailEnd type="triangle"/>
+          </a:ln>
+        </p:spPr>
+        <p:style>
+          <a:lnRef idx="1">
+            <a:schemeClr val="accent1"/>
+          </a:lnRef>
+          <a:fillRef idx="0">
+            <a:schemeClr val="accent1"/>
+          </a:fillRef>
+          <a:effectRef idx="0">
+            <a:schemeClr val="accent1"/>
+          </a:effectRef>
+          <a:fontRef idx="minor">
+            <a:schemeClr val="tx1"/>
+          </a:fontRef>
+        </p:style>
+      </p:cxnSp>
+      <p:cxnSp>
+        <p:nvCxnSpPr>
+          <p:cNvPr id="11" name="直接箭头连接符 10">
+            <a:extLst>
+              <a:ext uri="{FF2B5EF4-FFF2-40B4-BE49-F238E27FC236}">
+                <a16:creationId xmlns:a16="http://schemas.microsoft.com/office/drawing/2014/main" id="{D9109B97-FE33-4040-B318-8BD7105E667C}"/>
+              </a:ext>
+            </a:extLst>
+          </p:cNvPr>
+          <p:cNvCxnSpPr/>
+          <p:nvPr/>
+        </p:nvCxnSpPr>
+        <p:spPr>
+          <a:xfrm>
+            <a:off x="1464366" y="5148469"/>
+            <a:ext cx="3061252" cy="0"/>
+          </a:xfrm>
+          <a:prstGeom prst="straightConnector1">
+            <a:avLst/>
+          </a:prstGeom>
+          <a:ln>
+            <a:tailEnd type="triangle"/>
+          </a:ln>
+        </p:spPr>
+        <p:style>
+          <a:lnRef idx="1">
+            <a:schemeClr val="accent1"/>
+          </a:lnRef>
+          <a:fillRef idx="0">
+            <a:schemeClr val="accent1"/>
+          </a:fillRef>
+          <a:effectRef idx="0">
+            <a:schemeClr val="accent1"/>
+          </a:effectRef>
+          <a:fontRef idx="minor">
+            <a:schemeClr val="tx1"/>
+          </a:fontRef>
+        </p:style>
+      </p:cxnSp>
+      <p:sp>
+        <p:nvSpPr>
+          <p:cNvPr id="12" name="文本框 11">
+            <a:extLst>
+              <a:ext uri="{FF2B5EF4-FFF2-40B4-BE49-F238E27FC236}">
+                <a16:creationId xmlns:a16="http://schemas.microsoft.com/office/drawing/2014/main" id="{5D9B6620-C75A-4040-BEDF-12AE8985998F}"/>
+              </a:ext>
+            </a:extLst>
+          </p:cNvPr>
           <p:cNvSpPr txBox="1"/>
           <p:nvPr/>
         </p:nvSpPr>
         <p:spPr>
           <a:xfrm>
-            <a:off x="6447183" y="685800"/>
-            <a:ext cx="5029200" cy="5078313"/>
+            <a:off x="1881810" y="2915478"/>
+            <a:ext cx="1762538" cy="369332"/>
           </a:xfrm>
           <a:prstGeom prst="rect">
             <a:avLst/>
@@ -9761,133 +10218,28 @@
           <a:lstStyle/>
           <a:p>
             <a:r>
-              <a:rPr lang="en-US" altLang="zh-CN" dirty="0"/>
-              <a:t>1&lt;html&gt;</a:t>
-            </a:r>
-          </a:p>
-          <a:p>
-            <a:r>
-              <a:rPr lang="en-US" altLang="zh-CN" dirty="0"/>
-              <a:t>2	&lt;head&gt;</a:t>
-            </a:r>
-          </a:p>
-          <a:p>
-            <a:r>
-              <a:rPr lang="en-US" altLang="zh-CN" dirty="0"/>
-              <a:t>3		&lt;meta&gt;&lt;/meta&gt;</a:t>
-            </a:r>
-          </a:p>
-          <a:p>
-            <a:r>
-              <a:rPr lang="en-US" altLang="zh-CN" dirty="0"/>
-              <a:t>4	&lt;/head&gt;</a:t>
-            </a:r>
-          </a:p>
-          <a:p>
-            <a:r>
-              <a:rPr lang="en-US" altLang="zh-CN" dirty="0"/>
-              <a:t>5	&lt;body&gt;</a:t>
-            </a:r>
-          </a:p>
-          <a:p>
-            <a:r>
-              <a:rPr lang="en-US" altLang="zh-CN" dirty="0"/>
-              <a:t>6		&lt;header&gt;</a:t>
-            </a:r>
-          </a:p>
-          <a:p>
-            <a:r>
-              <a:rPr lang="en-US" altLang="zh-CN" dirty="0"/>
-              <a:t>7			&lt;p&gt;hello&lt;/&gt;</a:t>
-            </a:r>
-          </a:p>
-          <a:p>
-            <a:r>
-              <a:rPr lang="en-US" altLang="zh-CN" dirty="0"/>
-              <a:t>8		&lt;header&gt;</a:t>
-            </a:r>
-          </a:p>
-          <a:p>
-            <a:r>
-              <a:rPr lang="en-US" altLang="zh-CN" dirty="0"/>
-              <a:t>9		&lt;main&gt;</a:t>
-            </a:r>
-          </a:p>
-          <a:p>
-            <a:r>
-              <a:rPr lang="en-US" altLang="zh-CN" dirty="0"/>
-              <a:t>10			&lt;div&gt;123456789&lt;/div&gt;</a:t>
-            </a:r>
-          </a:p>
-          <a:p>
-            <a:r>
-              <a:rPr lang="en-US" altLang="zh-CN" dirty="0"/>
-              <a:t>11			&lt;div&gt;123456789&lt;/div&gt;</a:t>
-            </a:r>
-          </a:p>
-          <a:p>
-            <a:r>
-              <a:rPr lang="en-US" altLang="zh-CN" dirty="0"/>
-              <a:t>12			&lt;div&gt;123456789&lt;/div&gt;</a:t>
-            </a:r>
-          </a:p>
-          <a:p>
-            <a:r>
-              <a:rPr lang="en-US" altLang="zh-CN" dirty="0"/>
-              <a:t>13		&lt;/main&gt;</a:t>
-            </a:r>
-          </a:p>
-          <a:p>
-            <a:r>
-              <a:rPr lang="en-US" altLang="zh-CN" dirty="0"/>
-              <a:t>14		&lt;footer&gt;</a:t>
-            </a:r>
-          </a:p>
-          <a:p>
-            <a:r>
-              <a:rPr lang="en-US" altLang="zh-CN" dirty="0"/>
-              <a:t>15			&lt;p&gt;</a:t>
-            </a:r>
-            <a:r>
-              <a:rPr lang="zh-CN" altLang="en-US" dirty="0"/>
-              <a:t>版权</a:t>
-            </a:r>
-            <a:r>
-              <a:rPr lang="en-US" altLang="zh-CN" dirty="0"/>
-              <a:t>&lt;/p&gt;</a:t>
-            </a:r>
-          </a:p>
-          <a:p>
-            <a:r>
-              <a:rPr lang="en-US" altLang="zh-CN" dirty="0"/>
-              <a:t>16		&lt;/footer&gt;</a:t>
-            </a:r>
-          </a:p>
-          <a:p>
-            <a:r>
-              <a:rPr lang="en-US" altLang="zh-CN" dirty="0"/>
-              <a:t>17	&lt;body&gt;</a:t>
-            </a:r>
-          </a:p>
-          <a:p>
-            <a:r>
-              <a:rPr lang="en-US" altLang="zh-CN" dirty="0"/>
-              <a:t>18 &lt;/html&gt;</a:t>
-            </a:r>
-            <a:endParaRPr lang="zh-CN" altLang="en-US" dirty="0"/>
-          </a:p>
-        </p:txBody>
-      </p:sp>
-      <p:sp>
-        <p:nvSpPr>
-          <p:cNvPr id="6" name="文本框 5"/>
+              <a:rPr lang="zh-CN" altLang="en-US" dirty="0"/>
+              <a:t>网页输入</a:t>
+            </a:r>
+          </a:p>
+        </p:txBody>
+      </p:sp>
+      <p:sp>
+        <p:nvSpPr>
+          <p:cNvPr id="13" name="文本框 12">
+            <a:extLst>
+              <a:ext uri="{FF2B5EF4-FFF2-40B4-BE49-F238E27FC236}">
+                <a16:creationId xmlns:a16="http://schemas.microsoft.com/office/drawing/2014/main" id="{24641F6E-01B7-46CF-B070-4072CD16D789}"/>
+              </a:ext>
+            </a:extLst>
+          </p:cNvPr>
           <p:cNvSpPr txBox="1"/>
           <p:nvPr/>
         </p:nvSpPr>
         <p:spPr>
           <a:xfrm>
-            <a:off x="715617" y="2504660"/>
-            <a:ext cx="3379305" cy="4247317"/>
+            <a:off x="1846890" y="3445567"/>
+            <a:ext cx="1762538" cy="369332"/>
           </a:xfrm>
           <a:prstGeom prst="rect">
             <a:avLst/>
@@ -9901,101 +10253,310 @@
           <a:lstStyle/>
           <a:p>
             <a:r>
-              <a:rPr lang="en-US" altLang="zh-CN" dirty="0"/>
-              <a:t>1</a:t>
-            </a:r>
-          </a:p>
-          <a:p>
-            <a:r>
-              <a:rPr lang="en-US" altLang="zh-CN" dirty="0"/>
-              <a:t>2</a:t>
-            </a:r>
-          </a:p>
-          <a:p>
-            <a:r>
-              <a:rPr lang="en-US" altLang="zh-CN" dirty="0"/>
-              <a:t>3</a:t>
-            </a:r>
-          </a:p>
-          <a:p>
-            <a:r>
-              <a:rPr lang="en-US" altLang="zh-CN" dirty="0"/>
-              <a:t>4</a:t>
-            </a:r>
-          </a:p>
-          <a:p>
-            <a:r>
-              <a:rPr lang="en-US" altLang="zh-CN" dirty="0"/>
-              <a:t>5</a:t>
-            </a:r>
-          </a:p>
-          <a:p>
-            <a:r>
-              <a:rPr lang="en-US" altLang="zh-CN" dirty="0"/>
-              <a:t>6</a:t>
-            </a:r>
-          </a:p>
-          <a:p>
-            <a:r>
-              <a:rPr lang="en-US" altLang="zh-CN" dirty="0"/>
-              <a:t>7                             hello</a:t>
-            </a:r>
-          </a:p>
-          <a:p>
-            <a:r>
-              <a:rPr lang="en-US" altLang="zh-CN" dirty="0"/>
-              <a:t>8</a:t>
-            </a:r>
-          </a:p>
-          <a:p>
-            <a:r>
-              <a:rPr lang="en-US" altLang="zh-CN" dirty="0"/>
-              <a:t>9</a:t>
-            </a:r>
-          </a:p>
-          <a:p>
-            <a:r>
-              <a:rPr lang="en-US" altLang="zh-CN" dirty="0"/>
-              <a:t>10                         123456789</a:t>
-            </a:r>
-          </a:p>
-          <a:p>
-            <a:r>
-              <a:rPr lang="en-US" altLang="zh-CN" dirty="0"/>
-              <a:t>11                         123456789</a:t>
-            </a:r>
-          </a:p>
-          <a:p>
-            <a:r>
-              <a:rPr lang="en-US" altLang="zh-CN" dirty="0"/>
-              <a:t>12                         123456789</a:t>
-            </a:r>
-          </a:p>
-          <a:p>
-            <a:r>
-              <a:rPr lang="en-US" altLang="zh-CN" dirty="0"/>
-              <a:t>13</a:t>
-            </a:r>
-          </a:p>
-          <a:p>
-            <a:r>
-              <a:rPr lang="en-US" altLang="zh-CN" dirty="0"/>
-              <a:t>14</a:t>
-            </a:r>
-          </a:p>
-          <a:p>
-            <a:r>
-              <a:rPr lang="en-US" altLang="zh-CN" dirty="0"/>
-              <a:t>15                       </a:t>
-            </a:r>
-            <a:r>
-              <a:rPr lang="zh-CN" altLang="en-US" dirty="0"/>
-              <a:t>版权</a:t>
+              <a:rPr lang="zh-CN" altLang="en-US" dirty="0"/>
+              <a:t>网页输入</a:t>
+            </a:r>
+          </a:p>
+        </p:txBody>
+      </p:sp>
+      <p:sp>
+        <p:nvSpPr>
+          <p:cNvPr id="14" name="文本框 13">
+            <a:extLst>
+              <a:ext uri="{FF2B5EF4-FFF2-40B4-BE49-F238E27FC236}">
+                <a16:creationId xmlns:a16="http://schemas.microsoft.com/office/drawing/2014/main" id="{09BD1283-321D-4A2E-9ED0-EB95C5DBB146}"/>
+              </a:ext>
+            </a:extLst>
+          </p:cNvPr>
+          <p:cNvSpPr txBox="1"/>
+          <p:nvPr/>
+        </p:nvSpPr>
+        <p:spPr>
+          <a:xfrm>
+            <a:off x="1729410" y="4213327"/>
+            <a:ext cx="1762538" cy="369332"/>
+          </a:xfrm>
+          <a:prstGeom prst="rect">
+            <a:avLst/>
+          </a:prstGeom>
+          <a:noFill/>
+        </p:spPr>
+        <p:txBody>
+          <a:bodyPr wrap="square" rtlCol="0">
+            <a:spAutoFit/>
+          </a:bodyPr>
+          <a:lstStyle/>
+          <a:p>
+            <a:r>
+              <a:rPr lang="zh-CN" altLang="en-US" dirty="0"/>
+              <a:t>网页输入</a:t>
+            </a:r>
+          </a:p>
+        </p:txBody>
+      </p:sp>
+      <p:sp>
+        <p:nvSpPr>
+          <p:cNvPr id="15" name="文本框 14">
+            <a:extLst>
+              <a:ext uri="{FF2B5EF4-FFF2-40B4-BE49-F238E27FC236}">
+                <a16:creationId xmlns:a16="http://schemas.microsoft.com/office/drawing/2014/main" id="{36F97F7B-982D-4E54-A04C-1F7D65C9DFE0}"/>
+              </a:ext>
+            </a:extLst>
+          </p:cNvPr>
+          <p:cNvSpPr txBox="1"/>
+          <p:nvPr/>
+        </p:nvSpPr>
+        <p:spPr>
+          <a:xfrm>
+            <a:off x="1881810" y="4816509"/>
+            <a:ext cx="1762538" cy="369332"/>
+          </a:xfrm>
+          <a:prstGeom prst="rect">
+            <a:avLst/>
+          </a:prstGeom>
+          <a:noFill/>
+        </p:spPr>
+        <p:txBody>
+          <a:bodyPr wrap="square" rtlCol="0">
+            <a:spAutoFit/>
+          </a:bodyPr>
+          <a:lstStyle/>
+          <a:p>
+            <a:r>
+              <a:rPr lang="zh-CN" altLang="en-US" dirty="0"/>
+              <a:t>网页输入</a:t>
+            </a:r>
+          </a:p>
+        </p:txBody>
+      </p:sp>
+      <p:cxnSp>
+        <p:nvCxnSpPr>
+          <p:cNvPr id="16" name="直接箭头连接符 15">
+            <a:extLst>
+              <a:ext uri="{FF2B5EF4-FFF2-40B4-BE49-F238E27FC236}">
+                <a16:creationId xmlns:a16="http://schemas.microsoft.com/office/drawing/2014/main" id="{1BF0C2BB-7BD8-46FF-A39E-09802A4DB262}"/>
+              </a:ext>
+            </a:extLst>
+          </p:cNvPr>
+          <p:cNvCxnSpPr/>
+          <p:nvPr/>
+        </p:nvCxnSpPr>
+        <p:spPr>
+          <a:xfrm>
+            <a:off x="6274905" y="3100144"/>
+            <a:ext cx="3061252" cy="0"/>
+          </a:xfrm>
+          <a:prstGeom prst="straightConnector1">
+            <a:avLst/>
+          </a:prstGeom>
+          <a:ln>
+            <a:tailEnd type="triangle"/>
+          </a:ln>
+        </p:spPr>
+        <p:style>
+          <a:lnRef idx="1">
+            <a:schemeClr val="accent1"/>
+          </a:lnRef>
+          <a:fillRef idx="0">
+            <a:schemeClr val="accent1"/>
+          </a:fillRef>
+          <a:effectRef idx="0">
+            <a:schemeClr val="accent1"/>
+          </a:effectRef>
+          <a:fontRef idx="minor">
+            <a:schemeClr val="tx1"/>
+          </a:fontRef>
+        </p:style>
+      </p:cxnSp>
+      <p:cxnSp>
+        <p:nvCxnSpPr>
+          <p:cNvPr id="17" name="直接箭头连接符 16">
+            <a:extLst>
+              <a:ext uri="{FF2B5EF4-FFF2-40B4-BE49-F238E27FC236}">
+                <a16:creationId xmlns:a16="http://schemas.microsoft.com/office/drawing/2014/main" id="{0C7C25DC-E221-446A-A6CF-834777CF80C7}"/>
+              </a:ext>
+            </a:extLst>
+          </p:cNvPr>
+          <p:cNvCxnSpPr/>
+          <p:nvPr/>
+        </p:nvCxnSpPr>
+        <p:spPr>
+          <a:xfrm>
+            <a:off x="6274905" y="3935897"/>
+            <a:ext cx="3061252" cy="0"/>
+          </a:xfrm>
+          <a:prstGeom prst="straightConnector1">
+            <a:avLst/>
+          </a:prstGeom>
+          <a:ln>
+            <a:tailEnd type="triangle"/>
+          </a:ln>
+        </p:spPr>
+        <p:style>
+          <a:lnRef idx="1">
+            <a:schemeClr val="accent1"/>
+          </a:lnRef>
+          <a:fillRef idx="0">
+            <a:schemeClr val="accent1"/>
+          </a:fillRef>
+          <a:effectRef idx="0">
+            <a:schemeClr val="accent1"/>
+          </a:effectRef>
+          <a:fontRef idx="minor">
+            <a:schemeClr val="tx1"/>
+          </a:fontRef>
+        </p:style>
+      </p:cxnSp>
+      <p:cxnSp>
+        <p:nvCxnSpPr>
+          <p:cNvPr id="18" name="直接箭头连接符 17">
+            <a:extLst>
+              <a:ext uri="{FF2B5EF4-FFF2-40B4-BE49-F238E27FC236}">
+                <a16:creationId xmlns:a16="http://schemas.microsoft.com/office/drawing/2014/main" id="{BDB97299-282A-441E-B35A-88D7B27378F0}"/>
+              </a:ext>
+            </a:extLst>
+          </p:cNvPr>
+          <p:cNvCxnSpPr/>
+          <p:nvPr/>
+        </p:nvCxnSpPr>
+        <p:spPr>
+          <a:xfrm>
+            <a:off x="6274905" y="4691270"/>
+            <a:ext cx="3061252" cy="0"/>
+          </a:xfrm>
+          <a:prstGeom prst="straightConnector1">
+            <a:avLst/>
+          </a:prstGeom>
+          <a:ln>
+            <a:tailEnd type="triangle"/>
+          </a:ln>
+        </p:spPr>
+        <p:style>
+          <a:lnRef idx="1">
+            <a:schemeClr val="accent1"/>
+          </a:lnRef>
+          <a:fillRef idx="0">
+            <a:schemeClr val="accent1"/>
+          </a:fillRef>
+          <a:effectRef idx="0">
+            <a:schemeClr val="accent1"/>
+          </a:effectRef>
+          <a:fontRef idx="minor">
+            <a:schemeClr val="tx1"/>
+          </a:fontRef>
+        </p:style>
+      </p:cxnSp>
+      <p:sp>
+        <p:nvSpPr>
+          <p:cNvPr id="19" name="文本框 18">
+            <a:extLst>
+              <a:ext uri="{FF2B5EF4-FFF2-40B4-BE49-F238E27FC236}">
+                <a16:creationId xmlns:a16="http://schemas.microsoft.com/office/drawing/2014/main" id="{3A15E97D-BA7C-4047-8688-BCE777D71573}"/>
+              </a:ext>
+            </a:extLst>
+          </p:cNvPr>
+          <p:cNvSpPr txBox="1"/>
+          <p:nvPr/>
+        </p:nvSpPr>
+        <p:spPr>
+          <a:xfrm>
+            <a:off x="6765236" y="2771698"/>
+            <a:ext cx="1762538" cy="369332"/>
+          </a:xfrm>
+          <a:prstGeom prst="rect">
+            <a:avLst/>
+          </a:prstGeom>
+          <a:noFill/>
+        </p:spPr>
+        <p:txBody>
+          <a:bodyPr wrap="square" rtlCol="0">
+            <a:spAutoFit/>
+          </a:bodyPr>
+          <a:lstStyle/>
+          <a:p>
+            <a:r>
+              <a:rPr lang="zh-CN" altLang="en-US" dirty="0"/>
+              <a:t>分析输出</a:t>
+            </a:r>
+          </a:p>
+        </p:txBody>
+      </p:sp>
+      <p:sp>
+        <p:nvSpPr>
+          <p:cNvPr id="20" name="文本框 19">
+            <a:extLst>
+              <a:ext uri="{FF2B5EF4-FFF2-40B4-BE49-F238E27FC236}">
+                <a16:creationId xmlns:a16="http://schemas.microsoft.com/office/drawing/2014/main" id="{71C231EC-94DD-46F5-91BA-37797CAB2246}"/>
+              </a:ext>
+            </a:extLst>
+          </p:cNvPr>
+          <p:cNvSpPr txBox="1"/>
+          <p:nvPr/>
+        </p:nvSpPr>
+        <p:spPr>
+          <a:xfrm>
+            <a:off x="6765236" y="3630233"/>
+            <a:ext cx="1762538" cy="369332"/>
+          </a:xfrm>
+          <a:prstGeom prst="rect">
+            <a:avLst/>
+          </a:prstGeom>
+          <a:noFill/>
+        </p:spPr>
+        <p:txBody>
+          <a:bodyPr wrap="square" rtlCol="0">
+            <a:spAutoFit/>
+          </a:bodyPr>
+          <a:lstStyle/>
+          <a:p>
+            <a:r>
+              <a:rPr lang="zh-CN" altLang="en-US" dirty="0"/>
+              <a:t>分析输出</a:t>
+            </a:r>
+          </a:p>
+        </p:txBody>
+      </p:sp>
+      <p:sp>
+        <p:nvSpPr>
+          <p:cNvPr id="21" name="文本框 20">
+            <a:extLst>
+              <a:ext uri="{FF2B5EF4-FFF2-40B4-BE49-F238E27FC236}">
+                <a16:creationId xmlns:a16="http://schemas.microsoft.com/office/drawing/2014/main" id="{18E1B843-06BF-4A2D-95E2-9BB19C26CF0A}"/>
+              </a:ext>
+            </a:extLst>
+          </p:cNvPr>
+          <p:cNvSpPr txBox="1"/>
+          <p:nvPr/>
+        </p:nvSpPr>
+        <p:spPr>
+          <a:xfrm>
+            <a:off x="6765236" y="4333896"/>
+            <a:ext cx="1762538" cy="369332"/>
+          </a:xfrm>
+          <a:prstGeom prst="rect">
+            <a:avLst/>
+          </a:prstGeom>
+          <a:noFill/>
+        </p:spPr>
+        <p:txBody>
+          <a:bodyPr wrap="square" rtlCol="0">
+            <a:spAutoFit/>
+          </a:bodyPr>
+          <a:lstStyle/>
+          <a:p>
+            <a:r>
+              <a:rPr lang="zh-CN" altLang="en-US" dirty="0"/>
+              <a:t>分析输出</a:t>
             </a:r>
           </a:p>
         </p:txBody>
       </p:sp>
     </p:spTree>
+    <p:extLst>
+      <p:ext uri="{BB962C8B-B14F-4D97-AF65-F5344CB8AC3E}">
+        <p14:creationId xmlns:p14="http://schemas.microsoft.com/office/powerpoint/2010/main" val="203573638"/>
+      </p:ext>
+    </p:extLst>
   </p:cSld>
   <p:clrMapOvr>
     <a:masterClrMapping/>
@@ -10030,14 +10591,19 @@
             <p:ph type="title"/>
           </p:nvPr>
         </p:nvSpPr>
-        <p:spPr/>
+        <p:spPr>
+          <a:xfrm>
+            <a:off x="1066800" y="365363"/>
+            <a:ext cx="10058400" cy="1609344"/>
+          </a:xfrm>
+        </p:spPr>
         <p:txBody>
           <a:bodyPr/>
           <a:lstStyle/>
           <a:p>
             <a:r>
               <a:rPr lang="zh-CN" altLang="en-US" dirty="0"/>
-              <a:t>正文提取</a:t>
+              <a:t>正文提取算法</a:t>
             </a:r>
           </a:p>
         </p:txBody>
@@ -10052,99 +10618,181 @@
             <p:ph idx="1"/>
           </p:nvPr>
         </p:nvSpPr>
-        <p:spPr/>
+        <p:spPr>
+          <a:xfrm>
+            <a:off x="1069848" y="1948070"/>
+            <a:ext cx="10058400" cy="4224130"/>
+          </a:xfrm>
+        </p:spPr>
         <p:txBody>
           <a:bodyPr/>
           <a:lstStyle/>
           <a:p>
             <a:r>
               <a:rPr lang="zh-CN" altLang="en-US" dirty="0"/>
-              <a:t>统计空行 </a:t>
-            </a:r>
-            <a:r>
-              <a:rPr lang="en-US" altLang="zh-CN" dirty="0"/>
-              <a:t>1-6   8-9   13-14 </a:t>
-            </a:r>
-            <a:r>
-              <a:rPr lang="zh-CN" altLang="en-US" dirty="0"/>
-              <a:t>（实际上小于五行的空行不统计）</a:t>
-            </a:r>
-            <a:endParaRPr lang="en-US" altLang="zh-CN" dirty="0"/>
-          </a:p>
-          <a:p>
-            <a:r>
-              <a:rPr lang="zh-CN" altLang="en-US" dirty="0"/>
-              <a:t>统计两个空行之间的字数对于以上三个进行评分</a:t>
-            </a:r>
-            <a:endParaRPr lang="en-US" altLang="zh-CN" dirty="0"/>
-          </a:p>
-          <a:p>
-            <a:r>
-              <a:rPr lang="en-US" altLang="zh-CN" dirty="0"/>
-              <a:t>1-6 8-9  </a:t>
-            </a:r>
-            <a:r>
-              <a:rPr lang="zh-CN" altLang="en-US" dirty="0"/>
-              <a:t>之间字数 </a:t>
-            </a:r>
-            <a:r>
-              <a:rPr lang="en-US" altLang="zh-CN" dirty="0"/>
-              <a:t>5                6*2 + 5 = 17</a:t>
-            </a:r>
-          </a:p>
-          <a:p>
-            <a:r>
-              <a:rPr lang="en-US" altLang="zh-CN" dirty="0"/>
-              <a:t>8-9 13-14 </a:t>
-            </a:r>
-            <a:r>
-              <a:rPr lang="zh-CN" altLang="en-US" dirty="0"/>
-              <a:t>之间字数 </a:t>
-            </a:r>
-            <a:r>
-              <a:rPr lang="en-US" altLang="zh-CN" dirty="0"/>
-              <a:t>27          2*2 + 27 = 31</a:t>
-            </a:r>
-          </a:p>
-          <a:p>
-            <a:r>
-              <a:rPr lang="en-US" altLang="zh-CN" dirty="0"/>
-              <a:t>13-14 – end </a:t>
-            </a:r>
-            <a:r>
-              <a:rPr lang="zh-CN" altLang="en-US" dirty="0"/>
-              <a:t>字数 </a:t>
-            </a:r>
-            <a:r>
-              <a:rPr lang="en-US" altLang="zh-CN" dirty="0"/>
-              <a:t>2               2*3 + 2 = 8</a:t>
-            </a:r>
-          </a:p>
-          <a:p>
-            <a:r>
-              <a:rPr lang="zh-CN" altLang="en-US" dirty="0"/>
-              <a:t>提取分数最高的作为正文</a:t>
-            </a:r>
-          </a:p>
-        </p:txBody>
-      </p:sp>
-      <p:sp>
-        <p:nvSpPr>
-          <p:cNvPr id="4" name="矩形 3"/>
-          <p:cNvSpPr/>
+              <a:t>基于字符密度算法改进</a:t>
+            </a:r>
+          </a:p>
+        </p:txBody>
+      </p:sp>
+      <p:sp>
+        <p:nvSpPr>
+          <p:cNvPr id="5" name="文本框 4"/>
+          <p:cNvSpPr txBox="1"/>
           <p:nvPr/>
         </p:nvSpPr>
         <p:spPr>
           <a:xfrm>
-            <a:off x="7487479" y="1924883"/>
-            <a:ext cx="3525078" cy="4247317"/>
+            <a:off x="6447183" y="685800"/>
+            <a:ext cx="5029200" cy="5078313"/>
           </a:xfrm>
           <a:prstGeom prst="rect">
             <a:avLst/>
           </a:prstGeom>
-        </p:spPr>
-        <p:txBody>
-          <a:bodyPr wrap="square">
+          <a:noFill/>
+        </p:spPr>
+        <p:txBody>
+          <a:bodyPr wrap="square" rtlCol="0">
+            <a:spAutoFit/>
+          </a:bodyPr>
+          <a:lstStyle/>
+          <a:p>
+            <a:r>
+              <a:rPr lang="en-US" altLang="zh-CN" dirty="0"/>
+              <a:t>1&lt;html&gt;</a:t>
+            </a:r>
+          </a:p>
+          <a:p>
+            <a:r>
+              <a:rPr lang="en-US" altLang="zh-CN" dirty="0"/>
+              <a:t>2	&lt;head&gt;</a:t>
+            </a:r>
+          </a:p>
+          <a:p>
+            <a:r>
+              <a:rPr lang="en-US" altLang="zh-CN" dirty="0"/>
+              <a:t>3		&lt;meta&gt;&lt;/meta&gt;</a:t>
+            </a:r>
+          </a:p>
+          <a:p>
+            <a:r>
+              <a:rPr lang="en-US" altLang="zh-CN" dirty="0"/>
+              <a:t>4	&lt;/head&gt;</a:t>
+            </a:r>
+          </a:p>
+          <a:p>
+            <a:r>
+              <a:rPr lang="en-US" altLang="zh-CN" dirty="0"/>
+              <a:t>5	&lt;body&gt;</a:t>
+            </a:r>
+          </a:p>
+          <a:p>
+            <a:r>
+              <a:rPr lang="en-US" altLang="zh-CN" dirty="0"/>
+              <a:t>6		&lt;header&gt;</a:t>
+            </a:r>
+          </a:p>
+          <a:p>
+            <a:r>
+              <a:rPr lang="en-US" altLang="zh-CN" dirty="0"/>
+              <a:t>7			&lt;p&gt;hello&lt;/&gt;</a:t>
+            </a:r>
+          </a:p>
+          <a:p>
+            <a:r>
+              <a:rPr lang="en-US" altLang="zh-CN" dirty="0"/>
+              <a:t>8		&lt;header&gt;</a:t>
+            </a:r>
+          </a:p>
+          <a:p>
+            <a:r>
+              <a:rPr lang="en-US" altLang="zh-CN" dirty="0"/>
+              <a:t>9		&lt;main&gt;</a:t>
+            </a:r>
+          </a:p>
+          <a:p>
+            <a:r>
+              <a:rPr lang="en-US" altLang="zh-CN" dirty="0"/>
+              <a:t>10			&lt;div&gt;123456789&lt;/div&gt;</a:t>
+            </a:r>
+          </a:p>
+          <a:p>
+            <a:r>
+              <a:rPr lang="en-US" altLang="zh-CN" dirty="0"/>
+              <a:t>11			&lt;div&gt;123456789&lt;/div&gt;</a:t>
+            </a:r>
+          </a:p>
+          <a:p>
+            <a:r>
+              <a:rPr lang="en-US" altLang="zh-CN" dirty="0"/>
+              <a:t>12			&lt;div&gt;123456789&lt;/div&gt;</a:t>
+            </a:r>
+          </a:p>
+          <a:p>
+            <a:r>
+              <a:rPr lang="en-US" altLang="zh-CN" dirty="0"/>
+              <a:t>13		&lt;/main&gt;</a:t>
+            </a:r>
+          </a:p>
+          <a:p>
+            <a:r>
+              <a:rPr lang="en-US" altLang="zh-CN" dirty="0"/>
+              <a:t>14		&lt;footer&gt;</a:t>
+            </a:r>
+          </a:p>
+          <a:p>
+            <a:r>
+              <a:rPr lang="en-US" altLang="zh-CN" dirty="0"/>
+              <a:t>15			&lt;p&gt;</a:t>
+            </a:r>
+            <a:r>
+              <a:rPr lang="zh-CN" altLang="en-US" dirty="0"/>
+              <a:t>版权</a:t>
+            </a:r>
+            <a:r>
+              <a:rPr lang="en-US" altLang="zh-CN" dirty="0"/>
+              <a:t>&lt;/p&gt;</a:t>
+            </a:r>
+          </a:p>
+          <a:p>
+            <a:r>
+              <a:rPr lang="en-US" altLang="zh-CN" dirty="0"/>
+              <a:t>16		&lt;/footer&gt;</a:t>
+            </a:r>
+          </a:p>
+          <a:p>
+            <a:r>
+              <a:rPr lang="en-US" altLang="zh-CN" dirty="0"/>
+              <a:t>17	&lt;body&gt;</a:t>
+            </a:r>
+          </a:p>
+          <a:p>
+            <a:r>
+              <a:rPr lang="en-US" altLang="zh-CN" dirty="0"/>
+              <a:t>18 &lt;/html&gt;</a:t>
+            </a:r>
+            <a:endParaRPr lang="zh-CN" altLang="en-US" dirty="0"/>
+          </a:p>
+        </p:txBody>
+      </p:sp>
+      <p:sp>
+        <p:nvSpPr>
+          <p:cNvPr id="6" name="文本框 5"/>
+          <p:cNvSpPr txBox="1"/>
+          <p:nvPr/>
+        </p:nvSpPr>
+        <p:spPr>
+          <a:xfrm>
+            <a:off x="715617" y="2504660"/>
+            <a:ext cx="3379305" cy="4247317"/>
+          </a:xfrm>
+          <a:prstGeom prst="rect">
+            <a:avLst/>
+          </a:prstGeom>
+          <a:noFill/>
+        </p:spPr>
+        <p:txBody>
+          <a:bodyPr wrap="square" rtlCol="0">
             <a:spAutoFit/>
           </a:bodyPr>
           <a:lstStyle/>

</xml_diff>